<commit_message>
added more snapshots and slides
</commit_message>
<xml_diff>
--- a/Vehicle Calculator pres.pptx
+++ b/Vehicle Calculator pres.pptx
@@ -11,6 +11,9 @@
     <p:sldId id="259" r:id="rId5"/>
     <p:sldId id="258" r:id="rId6"/>
     <p:sldId id="261" r:id="rId7"/>
+    <p:sldId id="262" r:id="rId8"/>
+    <p:sldId id="263" r:id="rId9"/>
+    <p:sldId id="264" r:id="rId10"/>
   </p:sldIdLst>
   <p:sldSz cx="12192000" cy="6858000"/>
   <p:notesSz cx="6858000" cy="9144000"/>
@@ -6056,13 +6059,13 @@
   <p:clrMapOvr>
     <a:masterClrMapping/>
   </p:clrMapOvr>
-  <mc:AlternateContent xmlns:mc="http://schemas.openxmlformats.org/markup-compatibility/2006">
-    <mc:Choice xmlns:p14="http://schemas.microsoft.com/office/powerpoint/2010/main" Requires="p14">
+  <mc:AlternateContent xmlns:mc="http://schemas.openxmlformats.org/markup-compatibility/2006" xmlns:p14="http://schemas.microsoft.com/office/powerpoint/2010/main">
+    <mc:Choice Requires="p14">
       <p:transition spd="med" p14:dur="700">
         <p:fade/>
       </p:transition>
     </mc:Choice>
-    <mc:Fallback>
+    <mc:Fallback xmlns="">
       <p:transition spd="med">
         <p:fade/>
       </p:transition>
@@ -6322,13 +6325,13 @@
   <p:clrMapOvr>
     <a:masterClrMapping/>
   </p:clrMapOvr>
-  <mc:AlternateContent xmlns:mc="http://schemas.openxmlformats.org/markup-compatibility/2006">
-    <mc:Choice xmlns:p159="http://schemas.microsoft.com/office/powerpoint/2015/09/main" Requires="p159">
+  <mc:AlternateContent xmlns:mc="http://schemas.openxmlformats.org/markup-compatibility/2006" xmlns:p159="http://schemas.microsoft.com/office/powerpoint/2015/09/main">
+    <mc:Choice Requires="p159">
       <p:transition xmlns:p14="http://schemas.microsoft.com/office/powerpoint/2010/main" spd="slow" p14:dur="2000">
         <p159:morph option="byObject"/>
       </p:transition>
     </mc:Choice>
-    <mc:Fallback>
+    <mc:Fallback xmlns="">
       <p:transition spd="slow">
         <p:fade/>
       </p:transition>
@@ -6593,13 +6596,13 @@
   <p:clrMapOvr>
     <a:masterClrMapping/>
   </p:clrMapOvr>
-  <mc:AlternateContent xmlns:mc="http://schemas.openxmlformats.org/markup-compatibility/2006">
-    <mc:Choice xmlns:p14="http://schemas.microsoft.com/office/powerpoint/2010/main" Requires="p14">
+  <mc:AlternateContent xmlns:mc="http://schemas.openxmlformats.org/markup-compatibility/2006" xmlns:p14="http://schemas.microsoft.com/office/powerpoint/2010/main">
+    <mc:Choice Requires="p14">
       <p:transition spd="slow" p14:dur="800">
         <p:circle/>
       </p:transition>
     </mc:Choice>
-    <mc:Fallback>
+    <mc:Fallback xmlns="">
       <p:transition spd="slow">
         <p:circle/>
       </p:transition>
@@ -6905,13 +6908,13 @@
   <p:clrMapOvr>
     <a:masterClrMapping/>
   </p:clrMapOvr>
-  <mc:AlternateContent xmlns:mc="http://schemas.openxmlformats.org/markup-compatibility/2006">
-    <mc:Choice xmlns:p14="http://schemas.microsoft.com/office/powerpoint/2010/main" Requires="p14">
+  <mc:AlternateContent xmlns:mc="http://schemas.openxmlformats.org/markup-compatibility/2006" xmlns:p14="http://schemas.microsoft.com/office/powerpoint/2010/main">
+    <mc:Choice Requires="p14">
       <p:transition spd="slow" p14:dur="3400">
         <p14:reveal/>
       </p:transition>
     </mc:Choice>
-    <mc:Fallback>
+    <mc:Fallback xmlns="">
       <p:transition spd="slow">
         <p:fade/>
       </p:transition>
@@ -7145,7 +7148,7 @@
                   <a:schemeClr val="tx1"/>
                 </a:solidFill>
               </a:rPr>
-              <a:t>Type</a:t>
+              <a:t>Make</a:t>
             </a:r>
           </a:p>
           <a:p>
@@ -7180,6 +7183,645 @@
   <p:clrMapOvr>
     <a:masterClrMapping/>
   </p:clrMapOvr>
+  <mc:AlternateContent xmlns:mc="http://schemas.openxmlformats.org/markup-compatibility/2006">
+    <mc:Choice xmlns:p159="http://schemas.microsoft.com/office/powerpoint/2015/09/main" Requires="p159">
+      <p:transition xmlns:p14="http://schemas.microsoft.com/office/powerpoint/2010/main" spd="slow" p14:dur="2000">
+        <p159:morph option="byObject"/>
+      </p:transition>
+    </mc:Choice>
+    <mc:Fallback>
+      <p:transition spd="slow">
+        <p:fade/>
+      </p:transition>
+    </mc:Fallback>
+  </mc:AlternateContent>
+</p:sld>
+</file>
+
+<file path=ppt/slides/slide7.xml><?xml version="1.0" encoding="utf-8"?>
+<p:sld xmlns:a="http://schemas.openxmlformats.org/drawingml/2006/main" xmlns:r="http://schemas.openxmlformats.org/officeDocument/2006/relationships" xmlns:p="http://schemas.openxmlformats.org/presentationml/2006/main">
+  <p:cSld>
+    <p:bg>
+      <p:bgPr>
+        <a:solidFill>
+          <a:schemeClr val="bg1"/>
+        </a:solidFill>
+        <a:effectLst/>
+      </p:bgPr>
+    </p:bg>
+    <p:spTree>
+      <p:nvGrpSpPr>
+        <p:cNvPr id="1" name=""/>
+        <p:cNvGrpSpPr/>
+        <p:nvPr/>
+      </p:nvGrpSpPr>
+      <p:grpSpPr>
+        <a:xfrm>
+          <a:off x="0" y="0"/>
+          <a:ext cx="0" cy="0"/>
+          <a:chOff x="0" y="0"/>
+          <a:chExt cx="0" cy="0"/>
+        </a:xfrm>
+      </p:grpSpPr>
+      <p:sp useBgFill="1">
+        <p:nvSpPr>
+          <p:cNvPr id="20" name="Rectangle 19">
+            <a:extLst>
+              <a:ext uri="{FF2B5EF4-FFF2-40B4-BE49-F238E27FC236}">
+                <a16:creationId xmlns:a16="http://schemas.microsoft.com/office/drawing/2014/main" id="{8F4E830A-06F9-4EAA-9E65-110CF2421798}"/>
+              </a:ext>
+              <a:ext uri="{C183D7F6-B498-43B3-948B-1728B52AA6E4}">
+                <adec:decorative xmlns:adec="http://schemas.microsoft.com/office/drawing/2017/decorative" val="1"/>
+              </a:ext>
+            </a:extLst>
+          </p:cNvPr>
+          <p:cNvSpPr>
+            <a:spLocks noGrp="1" noRot="1" noChangeAspect="1" noMove="1" noResize="1" noEditPoints="1" noAdjustHandles="1" noChangeArrowheads="1" noChangeShapeType="1" noTextEdit="1"/>
+          </p:cNvSpPr>
+          <p:nvPr>
+            <p:extLst>
+              <p:ext uri="{386F3935-93C4-4BCD-93E2-E3B085C9AB24}">
+                <p16:designElem xmlns:p16="http://schemas.microsoft.com/office/powerpoint/2015/main" val="1"/>
+              </p:ext>
+            </p:extLst>
+          </p:nvPr>
+        </p:nvSpPr>
+        <p:spPr>
+          <a:xfrm>
+            <a:off x="-3175" y="0"/>
+            <a:ext cx="12192000" cy="6858000"/>
+          </a:xfrm>
+          <a:prstGeom prst="rect">
+            <a:avLst/>
+          </a:prstGeom>
+          <a:ln>
+            <a:noFill/>
+          </a:ln>
+        </p:spPr>
+        <p:style>
+          <a:lnRef idx="2">
+            <a:schemeClr val="accent1">
+              <a:shade val="50000"/>
+            </a:schemeClr>
+          </a:lnRef>
+          <a:fillRef idx="1">
+            <a:schemeClr val="accent1"/>
+          </a:fillRef>
+          <a:effectRef idx="0">
+            <a:schemeClr val="accent1"/>
+          </a:effectRef>
+          <a:fontRef idx="minor">
+            <a:schemeClr val="lt1"/>
+          </a:fontRef>
+        </p:style>
+        <p:txBody>
+          <a:bodyPr rtlCol="0" anchor="ctr"/>
+          <a:lstStyle/>
+          <a:p>
+            <a:pPr algn="ctr"/>
+            <a:endParaRPr lang="en-US"/>
+          </a:p>
+        </p:txBody>
+      </p:sp>
+      <p:pic>
+        <p:nvPicPr>
+          <p:cNvPr id="5" name="Picture 4">
+            <a:extLst>
+              <a:ext uri="{FF2B5EF4-FFF2-40B4-BE49-F238E27FC236}">
+                <a16:creationId xmlns:a16="http://schemas.microsoft.com/office/drawing/2014/main" id="{AF5D1226-C97F-4D7D-AAE3-6F44CF9B1539}"/>
+              </a:ext>
+            </a:extLst>
+          </p:cNvPr>
+          <p:cNvPicPr>
+            <a:picLocks noChangeAspect="1"/>
+          </p:cNvPicPr>
+          <p:nvPr/>
+        </p:nvPicPr>
+        <p:blipFill rotWithShape="1">
+          <a:blip r:embed="rId2">
+            <a:alphaModFix amt="35000"/>
+            <a:extLst>
+              <a:ext uri="{28A0092B-C50C-407E-A947-70E740481C1C}">
+                <a14:useLocalDpi xmlns:a14="http://schemas.microsoft.com/office/drawing/2010/main" val="0"/>
+              </a:ext>
+            </a:extLst>
+          </a:blip>
+          <a:srcRect r="1334"/>
+          <a:stretch/>
+        </p:blipFill>
+        <p:spPr>
+          <a:xfrm>
+            <a:off x="3175" y="387506"/>
+            <a:ext cx="12192000" cy="6857990"/>
+          </a:xfrm>
+          <a:prstGeom prst="rect">
+            <a:avLst/>
+          </a:prstGeom>
+        </p:spPr>
+      </p:pic>
+      <p:sp>
+        <p:nvSpPr>
+          <p:cNvPr id="2" name="Title 1">
+            <a:extLst>
+              <a:ext uri="{FF2B5EF4-FFF2-40B4-BE49-F238E27FC236}">
+                <a16:creationId xmlns:a16="http://schemas.microsoft.com/office/drawing/2014/main" id="{8F65C0EF-CF7B-49A4-8FFC-EB74881EB874}"/>
+              </a:ext>
+            </a:extLst>
+          </p:cNvPr>
+          <p:cNvSpPr>
+            <a:spLocks noGrp="1"/>
+          </p:cNvSpPr>
+          <p:nvPr>
+            <p:ph type="title"/>
+          </p:nvPr>
+        </p:nvSpPr>
+        <p:spPr>
+          <a:xfrm>
+            <a:off x="684212" y="4487332"/>
+            <a:ext cx="8534400" cy="1507067"/>
+          </a:xfrm>
+        </p:spPr>
+        <p:txBody>
+          <a:bodyPr>
+            <a:normAutofit/>
+          </a:bodyPr>
+          <a:lstStyle/>
+          <a:p>
+            <a:r>
+              <a:rPr lang="en-US" dirty="0"/>
+              <a:t>Vehicle industry</a:t>
+            </a:r>
+          </a:p>
+        </p:txBody>
+      </p:sp>
+      <p:sp>
+        <p:nvSpPr>
+          <p:cNvPr id="3" name="Content Placeholder 2">
+            <a:extLst>
+              <a:ext uri="{FF2B5EF4-FFF2-40B4-BE49-F238E27FC236}">
+                <a16:creationId xmlns:a16="http://schemas.microsoft.com/office/drawing/2014/main" id="{657D7D6C-D141-4BFA-B892-3EAC21597085}"/>
+              </a:ext>
+            </a:extLst>
+          </p:cNvPr>
+          <p:cNvSpPr>
+            <a:spLocks noGrp="1"/>
+          </p:cNvSpPr>
+          <p:nvPr>
+            <p:ph idx="1"/>
+          </p:nvPr>
+        </p:nvSpPr>
+        <p:spPr>
+          <a:xfrm>
+            <a:off x="684212" y="685800"/>
+            <a:ext cx="8534400" cy="3615267"/>
+          </a:xfrm>
+        </p:spPr>
+        <p:txBody>
+          <a:bodyPr>
+            <a:normAutofit/>
+          </a:bodyPr>
+          <a:lstStyle/>
+          <a:p>
+            <a:endParaRPr lang="en-US" dirty="0">
+              <a:solidFill>
+                <a:schemeClr val="tx1"/>
+              </a:solidFill>
+            </a:endParaRPr>
+          </a:p>
+          <a:p>
+            <a:r>
+              <a:rPr lang="en-US" dirty="0">
+                <a:solidFill>
+                  <a:schemeClr val="tx1"/>
+                </a:solidFill>
+              </a:rPr>
+              <a:t>How do they come up with their pricing?</a:t>
+            </a:r>
+          </a:p>
+          <a:p>
+            <a:pPr lvl="1">
+              <a:buFont typeface="Wingdings" panose="05000000000000000000" pitchFamily="2" charset="2"/>
+              <a:buChar char="v"/>
+            </a:pPr>
+            <a:r>
+              <a:rPr lang="en-US" dirty="0">
+                <a:solidFill>
+                  <a:schemeClr val="tx1"/>
+                </a:solidFill>
+              </a:rPr>
+              <a:t>Make</a:t>
+            </a:r>
+          </a:p>
+          <a:p>
+            <a:pPr marL="914400" lvl="2" indent="0">
+              <a:buNone/>
+            </a:pPr>
+            <a:endParaRPr lang="en-US" dirty="0">
+              <a:solidFill>
+                <a:schemeClr val="tx1"/>
+              </a:solidFill>
+            </a:endParaRPr>
+          </a:p>
+          <a:p>
+            <a:pPr marL="0" indent="0">
+              <a:buNone/>
+            </a:pPr>
+            <a:r>
+              <a:rPr lang="en-US" dirty="0">
+                <a:solidFill>
+                  <a:schemeClr val="tx1"/>
+                </a:solidFill>
+              </a:rPr>
+              <a:t>		</a:t>
+            </a:r>
+          </a:p>
+        </p:txBody>
+      </p:sp>
+      <p:pic>
+        <p:nvPicPr>
+          <p:cNvPr id="8" name="Picture 7">
+            <a:extLst>
+              <a:ext uri="{FF2B5EF4-FFF2-40B4-BE49-F238E27FC236}">
+                <a16:creationId xmlns:a16="http://schemas.microsoft.com/office/drawing/2014/main" id="{C7268D95-5B42-438D-9EB7-29FAE6EB642C}"/>
+              </a:ext>
+            </a:extLst>
+          </p:cNvPr>
+          <p:cNvPicPr>
+            <a:picLocks noChangeAspect="1"/>
+          </p:cNvPicPr>
+          <p:nvPr/>
+        </p:nvPicPr>
+        <p:blipFill>
+          <a:blip r:embed="rId3">
+            <a:extLst>
+              <a:ext uri="{28A0092B-C50C-407E-A947-70E740481C1C}">
+                <a14:useLocalDpi xmlns:a14="http://schemas.microsoft.com/office/drawing/2010/main" val="0"/>
+              </a:ext>
+            </a:extLst>
+          </a:blip>
+          <a:stretch>
+            <a:fillRect/>
+          </a:stretch>
+        </p:blipFill>
+        <p:spPr>
+          <a:xfrm>
+            <a:off x="3156733" y="2336645"/>
+            <a:ext cx="6296756" cy="2650222"/>
+          </a:xfrm>
+          <a:prstGeom prst="rect">
+            <a:avLst/>
+          </a:prstGeom>
+        </p:spPr>
+      </p:pic>
+    </p:spTree>
+    <p:extLst>
+      <p:ext uri="{BB962C8B-B14F-4D97-AF65-F5344CB8AC3E}">
+        <p14:creationId xmlns:p14="http://schemas.microsoft.com/office/powerpoint/2010/main" val="3994080204"/>
+      </p:ext>
+    </p:extLst>
+  </p:cSld>
+  <p:clrMapOvr>
+    <a:masterClrMapping/>
+  </p:clrMapOvr>
+  <mc:AlternateContent xmlns:mc="http://schemas.openxmlformats.org/markup-compatibility/2006">
+    <mc:Choice xmlns:p14="http://schemas.microsoft.com/office/powerpoint/2010/main" Requires="p14">
+      <p:transition spd="slow" p14:dur="3400">
+        <p14:reveal/>
+      </p:transition>
+    </mc:Choice>
+    <mc:Fallback>
+      <p:transition spd="slow">
+        <p:fade/>
+      </p:transition>
+    </mc:Fallback>
+  </mc:AlternateContent>
+</p:sld>
+</file>
+
+<file path=ppt/slides/slide8.xml><?xml version="1.0" encoding="utf-8"?>
+<p:sld xmlns:a="http://schemas.openxmlformats.org/drawingml/2006/main" xmlns:r="http://schemas.openxmlformats.org/officeDocument/2006/relationships" xmlns:p="http://schemas.openxmlformats.org/presentationml/2006/main">
+  <p:cSld>
+    <p:bg>
+      <p:bgPr>
+        <a:solidFill>
+          <a:schemeClr val="bg1"/>
+        </a:solidFill>
+        <a:effectLst/>
+      </p:bgPr>
+    </p:bg>
+    <p:spTree>
+      <p:nvGrpSpPr>
+        <p:cNvPr id="1" name=""/>
+        <p:cNvGrpSpPr/>
+        <p:nvPr/>
+      </p:nvGrpSpPr>
+      <p:grpSpPr>
+        <a:xfrm>
+          <a:off x="0" y="0"/>
+          <a:ext cx="0" cy="0"/>
+          <a:chOff x="0" y="0"/>
+          <a:chExt cx="0" cy="0"/>
+        </a:xfrm>
+      </p:grpSpPr>
+      <p:sp useBgFill="1">
+        <p:nvSpPr>
+          <p:cNvPr id="20" name="Rectangle 19">
+            <a:extLst>
+              <a:ext uri="{FF2B5EF4-FFF2-40B4-BE49-F238E27FC236}">
+                <a16:creationId xmlns:a16="http://schemas.microsoft.com/office/drawing/2014/main" id="{8F4E830A-06F9-4EAA-9E65-110CF2421798}"/>
+              </a:ext>
+              <a:ext uri="{C183D7F6-B498-43B3-948B-1728B52AA6E4}">
+                <adec:decorative xmlns:adec="http://schemas.microsoft.com/office/drawing/2017/decorative" val="1"/>
+              </a:ext>
+            </a:extLst>
+          </p:cNvPr>
+          <p:cNvSpPr>
+            <a:spLocks noGrp="1" noRot="1" noChangeAspect="1" noMove="1" noResize="1" noEditPoints="1" noAdjustHandles="1" noChangeArrowheads="1" noChangeShapeType="1" noTextEdit="1"/>
+          </p:cNvSpPr>
+          <p:nvPr>
+            <p:extLst>
+              <p:ext uri="{386F3935-93C4-4BCD-93E2-E3B085C9AB24}">
+                <p16:designElem xmlns:p16="http://schemas.microsoft.com/office/powerpoint/2015/main" val="1"/>
+              </p:ext>
+            </p:extLst>
+          </p:nvPr>
+        </p:nvSpPr>
+        <p:spPr>
+          <a:xfrm>
+            <a:off x="-3175" y="0"/>
+            <a:ext cx="12192000" cy="6858000"/>
+          </a:xfrm>
+          <a:prstGeom prst="rect">
+            <a:avLst/>
+          </a:prstGeom>
+          <a:ln>
+            <a:noFill/>
+          </a:ln>
+        </p:spPr>
+        <p:style>
+          <a:lnRef idx="2">
+            <a:schemeClr val="accent1">
+              <a:shade val="50000"/>
+            </a:schemeClr>
+          </a:lnRef>
+          <a:fillRef idx="1">
+            <a:schemeClr val="accent1"/>
+          </a:fillRef>
+          <a:effectRef idx="0">
+            <a:schemeClr val="accent1"/>
+          </a:effectRef>
+          <a:fontRef idx="minor">
+            <a:schemeClr val="lt1"/>
+          </a:fontRef>
+        </p:style>
+        <p:txBody>
+          <a:bodyPr rtlCol="0" anchor="ctr"/>
+          <a:lstStyle/>
+          <a:p>
+            <a:pPr algn="ctr"/>
+            <a:endParaRPr lang="en-US"/>
+          </a:p>
+        </p:txBody>
+      </p:sp>
+      <p:pic>
+        <p:nvPicPr>
+          <p:cNvPr id="5" name="Picture 4">
+            <a:extLst>
+              <a:ext uri="{FF2B5EF4-FFF2-40B4-BE49-F238E27FC236}">
+                <a16:creationId xmlns:a16="http://schemas.microsoft.com/office/drawing/2014/main" id="{AF5D1226-C97F-4D7D-AAE3-6F44CF9B1539}"/>
+              </a:ext>
+            </a:extLst>
+          </p:cNvPr>
+          <p:cNvPicPr>
+            <a:picLocks noChangeAspect="1"/>
+          </p:cNvPicPr>
+          <p:nvPr/>
+        </p:nvPicPr>
+        <p:blipFill rotWithShape="1">
+          <a:blip r:embed="rId2">
+            <a:alphaModFix amt="35000"/>
+            <a:extLst>
+              <a:ext uri="{28A0092B-C50C-407E-A947-70E740481C1C}">
+                <a14:useLocalDpi xmlns:a14="http://schemas.microsoft.com/office/drawing/2010/main" val="0"/>
+              </a:ext>
+            </a:extLst>
+          </a:blip>
+          <a:srcRect r="1334"/>
+          <a:stretch/>
+        </p:blipFill>
+        <p:spPr>
+          <a:xfrm>
+            <a:off x="-3175" y="182890"/>
+            <a:ext cx="12192000" cy="6857990"/>
+          </a:xfrm>
+          <a:prstGeom prst="rect">
+            <a:avLst/>
+          </a:prstGeom>
+        </p:spPr>
+      </p:pic>
+    </p:spTree>
+    <p:extLst>
+      <p:ext uri="{BB962C8B-B14F-4D97-AF65-F5344CB8AC3E}">
+        <p14:creationId xmlns:p14="http://schemas.microsoft.com/office/powerpoint/2010/main" val="2369271949"/>
+      </p:ext>
+    </p:extLst>
+  </p:cSld>
+  <p:clrMapOvr>
+    <a:masterClrMapping/>
+  </p:clrMapOvr>
+  <mc:AlternateContent xmlns:mc="http://schemas.openxmlformats.org/markup-compatibility/2006">
+    <mc:Choice xmlns:p14="http://schemas.microsoft.com/office/powerpoint/2010/main" Requires="p14">
+      <p:transition spd="slow" p14:dur="3400">
+        <p14:reveal/>
+      </p:transition>
+    </mc:Choice>
+    <mc:Fallback>
+      <p:transition spd="slow">
+        <p:fade/>
+      </p:transition>
+    </mc:Fallback>
+  </mc:AlternateContent>
+</p:sld>
+</file>
+
+<file path=ppt/slides/slide9.xml><?xml version="1.0" encoding="utf-8"?>
+<p:sld xmlns:a="http://schemas.openxmlformats.org/drawingml/2006/main" xmlns:r="http://schemas.openxmlformats.org/officeDocument/2006/relationships" xmlns:p="http://schemas.openxmlformats.org/presentationml/2006/main">
+  <p:cSld>
+    <p:bg>
+      <p:bgPr>
+        <a:solidFill>
+          <a:schemeClr val="bg1"/>
+        </a:solidFill>
+        <a:effectLst/>
+      </p:bgPr>
+    </p:bg>
+    <p:spTree>
+      <p:nvGrpSpPr>
+        <p:cNvPr id="1" name=""/>
+        <p:cNvGrpSpPr/>
+        <p:nvPr/>
+      </p:nvGrpSpPr>
+      <p:grpSpPr>
+        <a:xfrm>
+          <a:off x="0" y="0"/>
+          <a:ext cx="0" cy="0"/>
+          <a:chOff x="0" y="0"/>
+          <a:chExt cx="0" cy="0"/>
+        </a:xfrm>
+      </p:grpSpPr>
+      <p:sp useBgFill="1">
+        <p:nvSpPr>
+          <p:cNvPr id="20" name="Rectangle 19">
+            <a:extLst>
+              <a:ext uri="{FF2B5EF4-FFF2-40B4-BE49-F238E27FC236}">
+                <a16:creationId xmlns:a16="http://schemas.microsoft.com/office/drawing/2014/main" id="{8F4E830A-06F9-4EAA-9E65-110CF2421798}"/>
+              </a:ext>
+              <a:ext uri="{C183D7F6-B498-43B3-948B-1728B52AA6E4}">
+                <adec:decorative xmlns:adec="http://schemas.microsoft.com/office/drawing/2017/decorative" val="1"/>
+              </a:ext>
+            </a:extLst>
+          </p:cNvPr>
+          <p:cNvSpPr>
+            <a:spLocks noGrp="1" noRot="1" noChangeAspect="1" noMove="1" noResize="1" noEditPoints="1" noAdjustHandles="1" noChangeArrowheads="1" noChangeShapeType="1" noTextEdit="1"/>
+          </p:cNvSpPr>
+          <p:nvPr>
+            <p:extLst>
+              <p:ext uri="{386F3935-93C4-4BCD-93E2-E3B085C9AB24}">
+                <p16:designElem xmlns:p16="http://schemas.microsoft.com/office/powerpoint/2015/main" val="1"/>
+              </p:ext>
+            </p:extLst>
+          </p:nvPr>
+        </p:nvSpPr>
+        <p:spPr>
+          <a:xfrm>
+            <a:off x="-3175" y="0"/>
+            <a:ext cx="12192000" cy="6858000"/>
+          </a:xfrm>
+          <a:prstGeom prst="rect">
+            <a:avLst/>
+          </a:prstGeom>
+          <a:ln>
+            <a:noFill/>
+          </a:ln>
+        </p:spPr>
+        <p:style>
+          <a:lnRef idx="2">
+            <a:schemeClr val="accent1">
+              <a:shade val="50000"/>
+            </a:schemeClr>
+          </a:lnRef>
+          <a:fillRef idx="1">
+            <a:schemeClr val="accent1"/>
+          </a:fillRef>
+          <a:effectRef idx="0">
+            <a:schemeClr val="accent1"/>
+          </a:effectRef>
+          <a:fontRef idx="minor">
+            <a:schemeClr val="lt1"/>
+          </a:fontRef>
+        </p:style>
+        <p:txBody>
+          <a:bodyPr rtlCol="0" anchor="ctr"/>
+          <a:lstStyle/>
+          <a:p>
+            <a:pPr algn="ctr"/>
+            <a:endParaRPr lang="en-US"/>
+          </a:p>
+        </p:txBody>
+      </p:sp>
+      <p:pic>
+        <p:nvPicPr>
+          <p:cNvPr id="5" name="Picture 4">
+            <a:extLst>
+              <a:ext uri="{FF2B5EF4-FFF2-40B4-BE49-F238E27FC236}">
+                <a16:creationId xmlns:a16="http://schemas.microsoft.com/office/drawing/2014/main" id="{AF5D1226-C97F-4D7D-AAE3-6F44CF9B1539}"/>
+              </a:ext>
+            </a:extLst>
+          </p:cNvPr>
+          <p:cNvPicPr>
+            <a:picLocks noChangeAspect="1"/>
+          </p:cNvPicPr>
+          <p:nvPr/>
+        </p:nvPicPr>
+        <p:blipFill rotWithShape="1">
+          <a:blip r:embed="rId2">
+            <a:alphaModFix amt="35000"/>
+            <a:extLst>
+              <a:ext uri="{28A0092B-C50C-407E-A947-70E740481C1C}">
+                <a14:useLocalDpi xmlns:a14="http://schemas.microsoft.com/office/drawing/2010/main" val="0"/>
+              </a:ext>
+            </a:extLst>
+          </a:blip>
+          <a:srcRect r="1334"/>
+          <a:stretch/>
+        </p:blipFill>
+        <p:spPr>
+          <a:xfrm>
+            <a:off x="-3175" y="182890"/>
+            <a:ext cx="12192000" cy="6857990"/>
+          </a:xfrm>
+          <a:prstGeom prst="rect">
+            <a:avLst/>
+          </a:prstGeom>
+        </p:spPr>
+      </p:pic>
+      <p:sp>
+        <p:nvSpPr>
+          <p:cNvPr id="3" name="TextBox 2">
+            <a:extLst>
+              <a:ext uri="{FF2B5EF4-FFF2-40B4-BE49-F238E27FC236}">
+                <a16:creationId xmlns:a16="http://schemas.microsoft.com/office/drawing/2014/main" id="{85D53657-5A01-48AA-8B74-7CD9526778E0}"/>
+              </a:ext>
+            </a:extLst>
+          </p:cNvPr>
+          <p:cNvSpPr txBox="1"/>
+          <p:nvPr/>
+        </p:nvSpPr>
+        <p:spPr>
+          <a:xfrm rot="536217">
+            <a:off x="1603717" y="3242553"/>
+            <a:ext cx="5317588" cy="369332"/>
+          </a:xfrm>
+          <a:prstGeom prst="rect">
+            <a:avLst/>
+          </a:prstGeom>
+          <a:noFill/>
+        </p:spPr>
+        <p:txBody>
+          <a:bodyPr wrap="square" rtlCol="0">
+            <a:spAutoFit/>
+          </a:bodyPr>
+          <a:lstStyle/>
+          <a:p>
+            <a:r>
+              <a:rPr lang="en-US" dirty="0"/>
+              <a:t>Questions?</a:t>
+            </a:r>
+          </a:p>
+        </p:txBody>
+      </p:sp>
+    </p:spTree>
+    <p:extLst>
+      <p:ext uri="{BB962C8B-B14F-4D97-AF65-F5344CB8AC3E}">
+        <p14:creationId xmlns:p14="http://schemas.microsoft.com/office/powerpoint/2010/main" val="2780474705"/>
+      </p:ext>
+    </p:extLst>
+  </p:cSld>
+  <p:clrMapOvr>
+    <a:masterClrMapping/>
+  </p:clrMapOvr>
+  <mc:AlternateContent xmlns:mc="http://schemas.openxmlformats.org/markup-compatibility/2006">
+    <mc:Choice xmlns:p14="http://schemas.microsoft.com/office/powerpoint/2010/main" Requires="p14">
+      <p:transition spd="med" p14:dur="700">
+        <p:fade/>
+      </p:transition>
+    </mc:Choice>
+    <mc:Fallback>
+      <p:transition spd="med">
+        <p:fade/>
+      </p:transition>
+    </mc:Fallback>
+  </mc:AlternateContent>
 </p:sld>
 </file>
 

</xml_diff>

<commit_message>
added motivation and related works slides
</commit_message>
<xml_diff>
--- a/Vehicle Calculator pres.pptx
+++ b/Vehicle Calculator pres.pptx
@@ -6,14 +6,16 @@
   </p:sldMasterIdLst>
   <p:sldIdLst>
     <p:sldId id="256" r:id="rId2"/>
-    <p:sldId id="257" r:id="rId3"/>
-    <p:sldId id="260" r:id="rId4"/>
-    <p:sldId id="259" r:id="rId5"/>
-    <p:sldId id="258" r:id="rId6"/>
-    <p:sldId id="261" r:id="rId7"/>
-    <p:sldId id="262" r:id="rId8"/>
-    <p:sldId id="263" r:id="rId9"/>
-    <p:sldId id="264" r:id="rId10"/>
+    <p:sldId id="265" r:id="rId3"/>
+    <p:sldId id="266" r:id="rId4"/>
+    <p:sldId id="257" r:id="rId5"/>
+    <p:sldId id="260" r:id="rId6"/>
+    <p:sldId id="259" r:id="rId7"/>
+    <p:sldId id="258" r:id="rId8"/>
+    <p:sldId id="261" r:id="rId9"/>
+    <p:sldId id="262" r:id="rId10"/>
+    <p:sldId id="263" r:id="rId11"/>
+    <p:sldId id="264" r:id="rId12"/>
   </p:sldIdLst>
   <p:sldSz cx="12192000" cy="6858000"/>
   <p:notesSz cx="6858000" cy="9144000"/>
@@ -311,7 +313,7 @@
           <a:p>
             <a:fld id="{70C50077-83D7-4E88-80BE-7169A8979443}" type="datetimeFigureOut">
               <a:rPr lang="en-US" smtClean="0"/>
-              <a:t>10/7/2018</a:t>
+              <a:t>10/15/2018</a:t>
             </a:fld>
             <a:endParaRPr lang="en-US"/>
           </a:p>
@@ -747,7 +749,7 @@
           <a:p>
             <a:fld id="{70C50077-83D7-4E88-80BE-7169A8979443}" type="datetimeFigureOut">
               <a:rPr lang="en-US" smtClean="0"/>
-              <a:t>10/7/2018</a:t>
+              <a:t>10/15/2018</a:t>
             </a:fld>
             <a:endParaRPr lang="en-US"/>
           </a:p>
@@ -997,7 +999,7 @@
           <a:p>
             <a:fld id="{70C50077-83D7-4E88-80BE-7169A8979443}" type="datetimeFigureOut">
               <a:rPr lang="en-US" smtClean="0"/>
-              <a:t>10/7/2018</a:t>
+              <a:t>10/15/2018</a:t>
             </a:fld>
             <a:endParaRPr lang="en-US"/>
           </a:p>
@@ -1305,7 +1307,7 @@
           <a:p>
             <a:fld id="{70C50077-83D7-4E88-80BE-7169A8979443}" type="datetimeFigureOut">
               <a:rPr lang="en-US" smtClean="0"/>
-              <a:t>10/7/2018</a:t>
+              <a:t>10/15/2018</a:t>
             </a:fld>
             <a:endParaRPr lang="en-US"/>
           </a:p>
@@ -1623,7 +1625,7 @@
           <a:p>
             <a:fld id="{70C50077-83D7-4E88-80BE-7169A8979443}" type="datetimeFigureOut">
               <a:rPr lang="en-US" smtClean="0"/>
-              <a:t>10/7/2018</a:t>
+              <a:t>10/15/2018</a:t>
             </a:fld>
             <a:endParaRPr lang="en-US"/>
           </a:p>
@@ -1925,7 +1927,7 @@
           <a:p>
             <a:fld id="{70C50077-83D7-4E88-80BE-7169A8979443}" type="datetimeFigureOut">
               <a:rPr lang="en-US" smtClean="0"/>
-              <a:t>10/7/2018</a:t>
+              <a:t>10/15/2018</a:t>
             </a:fld>
             <a:endParaRPr lang="en-US"/>
           </a:p>
@@ -2292,7 +2294,7 @@
           <a:p>
             <a:fld id="{70C50077-83D7-4E88-80BE-7169A8979443}" type="datetimeFigureOut">
               <a:rPr lang="en-US" smtClean="0"/>
-              <a:t>10/7/2018</a:t>
+              <a:t>10/15/2018</a:t>
             </a:fld>
             <a:endParaRPr lang="en-US"/>
           </a:p>
@@ -2466,7 +2468,7 @@
           <a:p>
             <a:fld id="{70C50077-83D7-4E88-80BE-7169A8979443}" type="datetimeFigureOut">
               <a:rPr lang="en-US" smtClean="0"/>
-              <a:t>10/7/2018</a:t>
+              <a:t>10/15/2018</a:t>
             </a:fld>
             <a:endParaRPr lang="en-US"/>
           </a:p>
@@ -2646,7 +2648,7 @@
           <a:p>
             <a:fld id="{70C50077-83D7-4E88-80BE-7169A8979443}" type="datetimeFigureOut">
               <a:rPr lang="en-US" smtClean="0"/>
-              <a:t>10/7/2018</a:t>
+              <a:t>10/15/2018</a:t>
             </a:fld>
             <a:endParaRPr lang="en-US"/>
           </a:p>
@@ -2816,7 +2818,7 @@
           <a:p>
             <a:fld id="{70C50077-83D7-4E88-80BE-7169A8979443}" type="datetimeFigureOut">
               <a:rPr lang="en-US" smtClean="0"/>
-              <a:t>10/7/2018</a:t>
+              <a:t>10/15/2018</a:t>
             </a:fld>
             <a:endParaRPr lang="en-US"/>
           </a:p>
@@ -3066,7 +3068,7 @@
           <a:p>
             <a:fld id="{70C50077-83D7-4E88-80BE-7169A8979443}" type="datetimeFigureOut">
               <a:rPr lang="en-US" smtClean="0"/>
-              <a:t>10/7/2018</a:t>
+              <a:t>10/15/2018</a:t>
             </a:fld>
             <a:endParaRPr lang="en-US"/>
           </a:p>
@@ -3302,7 +3304,7 @@
           <a:p>
             <a:fld id="{70C50077-83D7-4E88-80BE-7169A8979443}" type="datetimeFigureOut">
               <a:rPr lang="en-US" smtClean="0"/>
-              <a:t>10/7/2018</a:t>
+              <a:t>10/15/2018</a:t>
             </a:fld>
             <a:endParaRPr lang="en-US"/>
           </a:p>
@@ -3684,7 +3686,7 @@
           <a:p>
             <a:fld id="{70C50077-83D7-4E88-80BE-7169A8979443}" type="datetimeFigureOut">
               <a:rPr lang="en-US" smtClean="0"/>
-              <a:t>10/7/2018</a:t>
+              <a:t>10/15/2018</a:t>
             </a:fld>
             <a:endParaRPr lang="en-US"/>
           </a:p>
@@ -3802,7 +3804,7 @@
           <a:p>
             <a:fld id="{70C50077-83D7-4E88-80BE-7169A8979443}" type="datetimeFigureOut">
               <a:rPr lang="en-US" smtClean="0"/>
-              <a:t>10/7/2018</a:t>
+              <a:t>10/15/2018</a:t>
             </a:fld>
             <a:endParaRPr lang="en-US"/>
           </a:p>
@@ -3897,7 +3899,7 @@
           <a:p>
             <a:fld id="{70C50077-83D7-4E88-80BE-7169A8979443}" type="datetimeFigureOut">
               <a:rPr lang="en-US" smtClean="0"/>
-              <a:t>10/7/2018</a:t>
+              <a:t>10/15/2018</a:t>
             </a:fld>
             <a:endParaRPr lang="en-US"/>
           </a:p>
@@ -4152,7 +4154,7 @@
           <a:p>
             <a:fld id="{70C50077-83D7-4E88-80BE-7169A8979443}" type="datetimeFigureOut">
               <a:rPr lang="en-US" smtClean="0"/>
-              <a:t>10/7/2018</a:t>
+              <a:t>10/15/2018</a:t>
             </a:fld>
             <a:endParaRPr lang="en-US"/>
           </a:p>
@@ -4435,7 +4437,7 @@
           <a:p>
             <a:fld id="{70C50077-83D7-4E88-80BE-7169A8979443}" type="datetimeFigureOut">
               <a:rPr lang="en-US" smtClean="0"/>
-              <a:t>10/7/2018</a:t>
+              <a:t>10/15/2018</a:t>
             </a:fld>
             <a:endParaRPr lang="en-US"/>
           </a:p>
@@ -4841,7 +4843,7 @@
           <a:p>
             <a:fld id="{70C50077-83D7-4E88-80BE-7169A8979443}" type="datetimeFigureOut">
               <a:rPr lang="en-US" smtClean="0"/>
-              <a:t>10/7/2018</a:t>
+              <a:t>10/15/2018</a:t>
             </a:fld>
             <a:endParaRPr lang="en-US"/>
           </a:p>
@@ -5847,6 +5849,333 @@
 </p:sld>
 </file>
 
+<file path=ppt/slides/slide10.xml><?xml version="1.0" encoding="utf-8"?>
+<p:sld xmlns:a="http://schemas.openxmlformats.org/drawingml/2006/main" xmlns:r="http://schemas.openxmlformats.org/officeDocument/2006/relationships" xmlns:p="http://schemas.openxmlformats.org/presentationml/2006/main">
+  <p:cSld>
+    <p:bg>
+      <p:bgPr>
+        <a:solidFill>
+          <a:schemeClr val="bg1"/>
+        </a:solidFill>
+        <a:effectLst/>
+      </p:bgPr>
+    </p:bg>
+    <p:spTree>
+      <p:nvGrpSpPr>
+        <p:cNvPr id="1" name=""/>
+        <p:cNvGrpSpPr/>
+        <p:nvPr/>
+      </p:nvGrpSpPr>
+      <p:grpSpPr>
+        <a:xfrm>
+          <a:off x="0" y="0"/>
+          <a:ext cx="0" cy="0"/>
+          <a:chOff x="0" y="0"/>
+          <a:chExt cx="0" cy="0"/>
+        </a:xfrm>
+      </p:grpSpPr>
+      <p:sp useBgFill="1">
+        <p:nvSpPr>
+          <p:cNvPr id="20" name="Rectangle 19">
+            <a:extLst>
+              <a:ext uri="{FF2B5EF4-FFF2-40B4-BE49-F238E27FC236}">
+                <a16:creationId xmlns:a16="http://schemas.microsoft.com/office/drawing/2014/main" id="{8F4E830A-06F9-4EAA-9E65-110CF2421798}"/>
+              </a:ext>
+              <a:ext uri="{C183D7F6-B498-43B3-948B-1728B52AA6E4}">
+                <adec:decorative xmlns:adec="http://schemas.microsoft.com/office/drawing/2017/decorative" val="1"/>
+              </a:ext>
+            </a:extLst>
+          </p:cNvPr>
+          <p:cNvSpPr>
+            <a:spLocks noGrp="1" noRot="1" noChangeAspect="1" noMove="1" noResize="1" noEditPoints="1" noAdjustHandles="1" noChangeArrowheads="1" noChangeShapeType="1" noTextEdit="1"/>
+          </p:cNvSpPr>
+          <p:nvPr>
+            <p:extLst>
+              <p:ext uri="{386F3935-93C4-4BCD-93E2-E3B085C9AB24}">
+                <p16:designElem xmlns:p16="http://schemas.microsoft.com/office/powerpoint/2015/main" val="1"/>
+              </p:ext>
+            </p:extLst>
+          </p:nvPr>
+        </p:nvSpPr>
+        <p:spPr>
+          <a:xfrm>
+            <a:off x="-3175" y="0"/>
+            <a:ext cx="12192000" cy="6858000"/>
+          </a:xfrm>
+          <a:prstGeom prst="rect">
+            <a:avLst/>
+          </a:prstGeom>
+          <a:ln>
+            <a:noFill/>
+          </a:ln>
+        </p:spPr>
+        <p:style>
+          <a:lnRef idx="2">
+            <a:schemeClr val="accent1">
+              <a:shade val="50000"/>
+            </a:schemeClr>
+          </a:lnRef>
+          <a:fillRef idx="1">
+            <a:schemeClr val="accent1"/>
+          </a:fillRef>
+          <a:effectRef idx="0">
+            <a:schemeClr val="accent1"/>
+          </a:effectRef>
+          <a:fontRef idx="minor">
+            <a:schemeClr val="lt1"/>
+          </a:fontRef>
+        </p:style>
+        <p:txBody>
+          <a:bodyPr rtlCol="0" anchor="ctr"/>
+          <a:lstStyle/>
+          <a:p>
+            <a:pPr algn="ctr"/>
+            <a:endParaRPr lang="en-US"/>
+          </a:p>
+        </p:txBody>
+      </p:sp>
+      <p:pic>
+        <p:nvPicPr>
+          <p:cNvPr id="5" name="Picture 4">
+            <a:extLst>
+              <a:ext uri="{FF2B5EF4-FFF2-40B4-BE49-F238E27FC236}">
+                <a16:creationId xmlns:a16="http://schemas.microsoft.com/office/drawing/2014/main" id="{AF5D1226-C97F-4D7D-AAE3-6F44CF9B1539}"/>
+              </a:ext>
+            </a:extLst>
+          </p:cNvPr>
+          <p:cNvPicPr>
+            <a:picLocks noChangeAspect="1"/>
+          </p:cNvPicPr>
+          <p:nvPr/>
+        </p:nvPicPr>
+        <p:blipFill rotWithShape="1">
+          <a:blip r:embed="rId2">
+            <a:alphaModFix amt="35000"/>
+            <a:extLst>
+              <a:ext uri="{28A0092B-C50C-407E-A947-70E740481C1C}">
+                <a14:useLocalDpi xmlns:a14="http://schemas.microsoft.com/office/drawing/2010/main" val="0"/>
+              </a:ext>
+            </a:extLst>
+          </a:blip>
+          <a:srcRect r="1334"/>
+          <a:stretch/>
+        </p:blipFill>
+        <p:spPr>
+          <a:xfrm>
+            <a:off x="-3175" y="182890"/>
+            <a:ext cx="12192000" cy="6857990"/>
+          </a:xfrm>
+          <a:prstGeom prst="rect">
+            <a:avLst/>
+          </a:prstGeom>
+        </p:spPr>
+      </p:pic>
+    </p:spTree>
+    <p:extLst>
+      <p:ext uri="{BB962C8B-B14F-4D97-AF65-F5344CB8AC3E}">
+        <p14:creationId xmlns:p14="http://schemas.microsoft.com/office/powerpoint/2010/main" val="2369271949"/>
+      </p:ext>
+    </p:extLst>
+  </p:cSld>
+  <p:clrMapOvr>
+    <a:masterClrMapping/>
+  </p:clrMapOvr>
+  <mc:AlternateContent xmlns:mc="http://schemas.openxmlformats.org/markup-compatibility/2006" xmlns:p14="http://schemas.microsoft.com/office/powerpoint/2010/main">
+    <mc:Choice Requires="p14">
+      <p:transition spd="slow" p14:dur="3400">
+        <p14:reveal/>
+      </p:transition>
+    </mc:Choice>
+    <mc:Fallback xmlns="">
+      <p:transition spd="slow">
+        <p:fade/>
+      </p:transition>
+    </mc:Fallback>
+  </mc:AlternateContent>
+</p:sld>
+</file>
+
+<file path=ppt/slides/slide11.xml><?xml version="1.0" encoding="utf-8"?>
+<p:sld xmlns:a="http://schemas.openxmlformats.org/drawingml/2006/main" xmlns:r="http://schemas.openxmlformats.org/officeDocument/2006/relationships" xmlns:p="http://schemas.openxmlformats.org/presentationml/2006/main">
+  <p:cSld>
+    <p:bg>
+      <p:bgPr>
+        <a:solidFill>
+          <a:schemeClr val="bg1"/>
+        </a:solidFill>
+        <a:effectLst/>
+      </p:bgPr>
+    </p:bg>
+    <p:spTree>
+      <p:nvGrpSpPr>
+        <p:cNvPr id="1" name=""/>
+        <p:cNvGrpSpPr/>
+        <p:nvPr/>
+      </p:nvGrpSpPr>
+      <p:grpSpPr>
+        <a:xfrm>
+          <a:off x="0" y="0"/>
+          <a:ext cx="0" cy="0"/>
+          <a:chOff x="0" y="0"/>
+          <a:chExt cx="0" cy="0"/>
+        </a:xfrm>
+      </p:grpSpPr>
+      <p:sp useBgFill="1">
+        <p:nvSpPr>
+          <p:cNvPr id="20" name="Rectangle 19">
+            <a:extLst>
+              <a:ext uri="{FF2B5EF4-FFF2-40B4-BE49-F238E27FC236}">
+                <a16:creationId xmlns:a16="http://schemas.microsoft.com/office/drawing/2014/main" id="{8F4E830A-06F9-4EAA-9E65-110CF2421798}"/>
+              </a:ext>
+              <a:ext uri="{C183D7F6-B498-43B3-948B-1728B52AA6E4}">
+                <adec:decorative xmlns:adec="http://schemas.microsoft.com/office/drawing/2017/decorative" val="1"/>
+              </a:ext>
+            </a:extLst>
+          </p:cNvPr>
+          <p:cNvSpPr>
+            <a:spLocks noGrp="1" noRot="1" noChangeAspect="1" noMove="1" noResize="1" noEditPoints="1" noAdjustHandles="1" noChangeArrowheads="1" noChangeShapeType="1" noTextEdit="1"/>
+          </p:cNvSpPr>
+          <p:nvPr>
+            <p:extLst>
+              <p:ext uri="{386F3935-93C4-4BCD-93E2-E3B085C9AB24}">
+                <p16:designElem xmlns:p16="http://schemas.microsoft.com/office/powerpoint/2015/main" val="1"/>
+              </p:ext>
+            </p:extLst>
+          </p:nvPr>
+        </p:nvSpPr>
+        <p:spPr>
+          <a:xfrm>
+            <a:off x="-3175" y="0"/>
+            <a:ext cx="12192000" cy="6858000"/>
+          </a:xfrm>
+          <a:prstGeom prst="rect">
+            <a:avLst/>
+          </a:prstGeom>
+          <a:ln>
+            <a:noFill/>
+          </a:ln>
+        </p:spPr>
+        <p:style>
+          <a:lnRef idx="2">
+            <a:schemeClr val="accent1">
+              <a:shade val="50000"/>
+            </a:schemeClr>
+          </a:lnRef>
+          <a:fillRef idx="1">
+            <a:schemeClr val="accent1"/>
+          </a:fillRef>
+          <a:effectRef idx="0">
+            <a:schemeClr val="accent1"/>
+          </a:effectRef>
+          <a:fontRef idx="minor">
+            <a:schemeClr val="lt1"/>
+          </a:fontRef>
+        </p:style>
+        <p:txBody>
+          <a:bodyPr rtlCol="0" anchor="ctr"/>
+          <a:lstStyle/>
+          <a:p>
+            <a:pPr algn="ctr"/>
+            <a:endParaRPr lang="en-US"/>
+          </a:p>
+        </p:txBody>
+      </p:sp>
+      <p:pic>
+        <p:nvPicPr>
+          <p:cNvPr id="5" name="Picture 4">
+            <a:extLst>
+              <a:ext uri="{FF2B5EF4-FFF2-40B4-BE49-F238E27FC236}">
+                <a16:creationId xmlns:a16="http://schemas.microsoft.com/office/drawing/2014/main" id="{AF5D1226-C97F-4D7D-AAE3-6F44CF9B1539}"/>
+              </a:ext>
+            </a:extLst>
+          </p:cNvPr>
+          <p:cNvPicPr>
+            <a:picLocks noChangeAspect="1"/>
+          </p:cNvPicPr>
+          <p:nvPr/>
+        </p:nvPicPr>
+        <p:blipFill rotWithShape="1">
+          <a:blip r:embed="rId2">
+            <a:alphaModFix amt="35000"/>
+            <a:extLst>
+              <a:ext uri="{28A0092B-C50C-407E-A947-70E740481C1C}">
+                <a14:useLocalDpi xmlns:a14="http://schemas.microsoft.com/office/drawing/2010/main" val="0"/>
+              </a:ext>
+            </a:extLst>
+          </a:blip>
+          <a:srcRect r="1334"/>
+          <a:stretch/>
+        </p:blipFill>
+        <p:spPr>
+          <a:xfrm>
+            <a:off x="-3175" y="182890"/>
+            <a:ext cx="12192000" cy="6857990"/>
+          </a:xfrm>
+          <a:prstGeom prst="rect">
+            <a:avLst/>
+          </a:prstGeom>
+        </p:spPr>
+      </p:pic>
+      <p:sp>
+        <p:nvSpPr>
+          <p:cNvPr id="3" name="TextBox 2">
+            <a:extLst>
+              <a:ext uri="{FF2B5EF4-FFF2-40B4-BE49-F238E27FC236}">
+                <a16:creationId xmlns:a16="http://schemas.microsoft.com/office/drawing/2014/main" id="{85D53657-5A01-48AA-8B74-7CD9526778E0}"/>
+              </a:ext>
+            </a:extLst>
+          </p:cNvPr>
+          <p:cNvSpPr txBox="1"/>
+          <p:nvPr/>
+        </p:nvSpPr>
+        <p:spPr>
+          <a:xfrm rot="536217">
+            <a:off x="1603717" y="3242553"/>
+            <a:ext cx="5317588" cy="369332"/>
+          </a:xfrm>
+          <a:prstGeom prst="rect">
+            <a:avLst/>
+          </a:prstGeom>
+          <a:noFill/>
+        </p:spPr>
+        <p:txBody>
+          <a:bodyPr wrap="square" rtlCol="0">
+            <a:spAutoFit/>
+          </a:bodyPr>
+          <a:lstStyle/>
+          <a:p>
+            <a:r>
+              <a:rPr lang="en-US" dirty="0"/>
+              <a:t>Questions?</a:t>
+            </a:r>
+          </a:p>
+        </p:txBody>
+      </p:sp>
+    </p:spTree>
+    <p:extLst>
+      <p:ext uri="{BB962C8B-B14F-4D97-AF65-F5344CB8AC3E}">
+        <p14:creationId xmlns:p14="http://schemas.microsoft.com/office/powerpoint/2010/main" val="2780474705"/>
+      </p:ext>
+    </p:extLst>
+  </p:cSld>
+  <p:clrMapOvr>
+    <a:masterClrMapping/>
+  </p:clrMapOvr>
+  <mc:AlternateContent xmlns:mc="http://schemas.openxmlformats.org/markup-compatibility/2006" xmlns:p14="http://schemas.microsoft.com/office/powerpoint/2010/main">
+    <mc:Choice Requires="p14">
+      <p:transition spd="med" p14:dur="700">
+        <p:fade/>
+      </p:transition>
+    </mc:Choice>
+    <mc:Fallback xmlns="">
+      <p:transition spd="med">
+        <p:fade/>
+      </p:transition>
+    </mc:Fallback>
+  </mc:AlternateContent>
+</p:sld>
+</file>
+
 <file path=ppt/slides/slide2.xml><?xml version="1.0" encoding="utf-8"?>
 <p:sld xmlns:a="http://schemas.openxmlformats.org/drawingml/2006/main" xmlns:r="http://schemas.openxmlformats.org/officeDocument/2006/relationships" xmlns:p="http://schemas.openxmlformats.org/presentationml/2006/main">
   <p:cSld>
@@ -5874,10 +6203,10 @@
       </p:grpSpPr>
       <p:sp useBgFill="1">
         <p:nvSpPr>
-          <p:cNvPr id="20" name="Rectangle 19">
+          <p:cNvPr id="10" name="Rectangle 9">
             <a:extLst>
               <a:ext uri="{FF2B5EF4-FFF2-40B4-BE49-F238E27FC236}">
-                <a16:creationId xmlns:a16="http://schemas.microsoft.com/office/drawing/2014/main" id="{8F4E830A-06F9-4EAA-9E65-110CF2421798}"/>
+                <a16:creationId xmlns:a16="http://schemas.microsoft.com/office/drawing/2014/main" id="{7A675F33-98AF-4B83-A3BB-0780A23145E6}"/>
               </a:ext>
               <a:ext uri="{C183D7F6-B498-43B3-948B-1728B52AA6E4}">
                 <adec:decorative xmlns:adec="http://schemas.microsoft.com/office/drawing/2017/decorative" val="1"/>
@@ -5937,7 +6266,7 @@
           <p:cNvPr id="5" name="Picture 4">
             <a:extLst>
               <a:ext uri="{FF2B5EF4-FFF2-40B4-BE49-F238E27FC236}">
-                <a16:creationId xmlns:a16="http://schemas.microsoft.com/office/drawing/2014/main" id="{AF5D1226-C97F-4D7D-AAE3-6F44CF9B1539}"/>
+                <a16:creationId xmlns:a16="http://schemas.microsoft.com/office/drawing/2014/main" id="{D42E5132-BF3B-4E1B-9586-6BFBC76B74E8}"/>
               </a:ext>
             </a:extLst>
           </p:cNvPr>
@@ -5948,7 +6277,7 @@
         </p:nvPicPr>
         <p:blipFill rotWithShape="1">
           <a:blip r:embed="rId2">
-            <a:alphaModFix amt="35000"/>
+            <a:alphaModFix amt="40000"/>
             <a:extLst>
               <a:ext uri="{28A0092B-C50C-407E-A947-70E740481C1C}">
                 <a14:useLocalDpi xmlns:a14="http://schemas.microsoft.com/office/drawing/2010/main" val="0"/>
@@ -5960,7 +6289,7 @@
         </p:blipFill>
         <p:spPr>
           <a:xfrm>
-            <a:off x="3174" y="10"/>
+            <a:off x="-3175" y="10"/>
             <a:ext cx="12192000" cy="6857990"/>
           </a:xfrm>
           <a:prstGeom prst="rect">
@@ -5973,7 +6302,7 @@
           <p:cNvPr id="2" name="Title 1">
             <a:extLst>
               <a:ext uri="{FF2B5EF4-FFF2-40B4-BE49-F238E27FC236}">
-                <a16:creationId xmlns:a16="http://schemas.microsoft.com/office/drawing/2014/main" id="{8F65C0EF-CF7B-49A4-8FFC-EB74881EB874}"/>
+                <a16:creationId xmlns:a16="http://schemas.microsoft.com/office/drawing/2014/main" id="{2E2E8756-8FBA-4A53-8F85-13231DA2C25E}"/>
               </a:ext>
             </a:extLst>
           </p:cNvPr>
@@ -5981,13 +6310,13 @@
             <a:spLocks noGrp="1"/>
           </p:cNvSpPr>
           <p:nvPr>
-            <p:ph type="title"/>
+            <p:ph type="ctrTitle"/>
           </p:nvPr>
         </p:nvSpPr>
         <p:spPr>
           <a:xfrm>
-            <a:off x="684212" y="4487332"/>
-            <a:ext cx="8534400" cy="1507067"/>
+            <a:off x="684212" y="685799"/>
+            <a:ext cx="8001000" cy="2971801"/>
           </a:xfrm>
         </p:spPr>
         <p:txBody>
@@ -5998,17 +6327,17 @@
           <a:p>
             <a:r>
               <a:rPr lang="en-US" dirty="0"/>
-              <a:t>Vehicle industry</a:t>
-            </a:r>
-          </a:p>
-        </p:txBody>
-      </p:sp>
-      <p:sp>
-        <p:nvSpPr>
-          <p:cNvPr id="3" name="Content Placeholder 2">
+              <a:t>motivation</a:t>
+            </a:r>
+          </a:p>
+        </p:txBody>
+      </p:sp>
+      <p:sp>
+        <p:nvSpPr>
+          <p:cNvPr id="3" name="Subtitle 2">
             <a:extLst>
               <a:ext uri="{FF2B5EF4-FFF2-40B4-BE49-F238E27FC236}">
-                <a16:creationId xmlns:a16="http://schemas.microsoft.com/office/drawing/2014/main" id="{657D7D6C-D141-4BFA-B892-3EAC21597085}"/>
+                <a16:creationId xmlns:a16="http://schemas.microsoft.com/office/drawing/2014/main" id="{D66E569F-6ABB-42AA-9EFE-D31270BED79A}"/>
               </a:ext>
             </a:extLst>
           </p:cNvPr>
@@ -6016,13 +6345,13 @@
             <a:spLocks noGrp="1"/>
           </p:cNvSpPr>
           <p:nvPr>
-            <p:ph idx="1"/>
+            <p:ph type="subTitle" idx="1"/>
           </p:nvPr>
         </p:nvSpPr>
         <p:spPr>
           <a:xfrm>
-            <a:off x="684212" y="685800"/>
-            <a:ext cx="8534400" cy="3615267"/>
+            <a:off x="684212" y="3843867"/>
+            <a:ext cx="6765100" cy="1947333"/>
           </a:xfrm>
         </p:spPr>
         <p:txBody>
@@ -6031,46 +6360,67 @@
           </a:bodyPr>
           <a:lstStyle/>
           <a:p>
+            <a:pPr marL="342900" indent="-342900">
+              <a:buFont typeface="Arial" panose="020B0604020202020204" pitchFamily="34" charset="0"/>
+              <a:buChar char="•"/>
+            </a:pPr>
             <a:r>
               <a:rPr lang="en-US" dirty="0">
                 <a:solidFill>
                   <a:schemeClr val="tx1"/>
                 </a:solidFill>
               </a:rPr>
-              <a:t>How do they come up with their pricing?</a:t>
-            </a:r>
-          </a:p>
-          <a:p>
+              <a:t>build an application that had something to do with cars.</a:t>
+            </a:r>
+          </a:p>
+          <a:p>
+            <a:pPr marL="342900" indent="-342900">
+              <a:buFont typeface="Arial" panose="020B0604020202020204" pitchFamily="34" charset="0"/>
+              <a:buChar char="•"/>
+            </a:pPr>
+            <a:r>
+              <a:rPr lang="en-US" dirty="0">
+                <a:solidFill>
+                  <a:schemeClr val="tx1"/>
+                </a:solidFill>
+              </a:rPr>
+              <a:t>Curiosity, vehicle pricing, contributing factors</a:t>
+            </a:r>
+          </a:p>
+          <a:p>
+            <a:pPr marL="342900" indent="-342900">
+              <a:buFont typeface="Arial" panose="020B0604020202020204" pitchFamily="34" charset="0"/>
+              <a:buChar char="•"/>
+            </a:pPr>
             <a:endParaRPr lang="en-US" dirty="0">
               <a:solidFill>
                 <a:schemeClr val="tx1"/>
               </a:solidFill>
             </a:endParaRPr>
           </a:p>
+          <a:p>
+            <a:pPr marL="342900" indent="-342900">
+              <a:buFont typeface="Arial" panose="020B0604020202020204" pitchFamily="34" charset="0"/>
+              <a:buChar char="•"/>
+            </a:pPr>
+            <a:endParaRPr lang="en-US" dirty="0">
+              <a:solidFill>
+                <a:schemeClr val="tx1"/>
+              </a:solidFill>
+            </a:endParaRPr>
+          </a:p>
         </p:txBody>
       </p:sp>
     </p:spTree>
     <p:extLst>
       <p:ext uri="{BB962C8B-B14F-4D97-AF65-F5344CB8AC3E}">
-        <p14:creationId xmlns:p14="http://schemas.microsoft.com/office/powerpoint/2010/main" val="2878631596"/>
+        <p14:creationId xmlns:p14="http://schemas.microsoft.com/office/powerpoint/2010/main" val="2102372963"/>
       </p:ext>
     </p:extLst>
   </p:cSld>
   <p:clrMapOvr>
     <a:masterClrMapping/>
   </p:clrMapOvr>
-  <mc:AlternateContent xmlns:mc="http://schemas.openxmlformats.org/markup-compatibility/2006" xmlns:p14="http://schemas.microsoft.com/office/powerpoint/2010/main">
-    <mc:Choice Requires="p14">
-      <p:transition spd="med" p14:dur="700">
-        <p:fade/>
-      </p:transition>
-    </mc:Choice>
-    <mc:Fallback xmlns="">
-      <p:transition spd="med">
-        <p:fade/>
-      </p:transition>
-    </mc:Fallback>
-  </mc:AlternateContent>
 </p:sld>
 </file>
 
@@ -6101,10 +6451,10 @@
       </p:grpSpPr>
       <p:sp useBgFill="1">
         <p:nvSpPr>
-          <p:cNvPr id="20" name="Rectangle 19">
+          <p:cNvPr id="10" name="Rectangle 9">
             <a:extLst>
               <a:ext uri="{FF2B5EF4-FFF2-40B4-BE49-F238E27FC236}">
-                <a16:creationId xmlns:a16="http://schemas.microsoft.com/office/drawing/2014/main" id="{8F4E830A-06F9-4EAA-9E65-110CF2421798}"/>
+                <a16:creationId xmlns:a16="http://schemas.microsoft.com/office/drawing/2014/main" id="{7A675F33-98AF-4B83-A3BB-0780A23145E6}"/>
               </a:ext>
               <a:ext uri="{C183D7F6-B498-43B3-948B-1728B52AA6E4}">
                 <adec:decorative xmlns:adec="http://schemas.microsoft.com/office/drawing/2017/decorative" val="1"/>
@@ -6164,7 +6514,7 @@
           <p:cNvPr id="5" name="Picture 4">
             <a:extLst>
               <a:ext uri="{FF2B5EF4-FFF2-40B4-BE49-F238E27FC236}">
-                <a16:creationId xmlns:a16="http://schemas.microsoft.com/office/drawing/2014/main" id="{AF5D1226-C97F-4D7D-AAE3-6F44CF9B1539}"/>
+                <a16:creationId xmlns:a16="http://schemas.microsoft.com/office/drawing/2014/main" id="{D42E5132-BF3B-4E1B-9586-6BFBC76B74E8}"/>
               </a:ext>
             </a:extLst>
           </p:cNvPr>
@@ -6175,7 +6525,7 @@
         </p:nvPicPr>
         <p:blipFill rotWithShape="1">
           <a:blip r:embed="rId2">
-            <a:alphaModFix amt="35000"/>
+            <a:alphaModFix amt="40000"/>
             <a:extLst>
               <a:ext uri="{28A0092B-C50C-407E-A947-70E740481C1C}">
                 <a14:useLocalDpi xmlns:a14="http://schemas.microsoft.com/office/drawing/2010/main" val="0"/>
@@ -6187,7 +6537,7 @@
         </p:blipFill>
         <p:spPr>
           <a:xfrm>
-            <a:off x="3174" y="10"/>
+            <a:off x="-3175" y="10"/>
             <a:ext cx="12192000" cy="6857990"/>
           </a:xfrm>
           <a:prstGeom prst="rect">
@@ -6200,7 +6550,7 @@
           <p:cNvPr id="2" name="Title 1">
             <a:extLst>
               <a:ext uri="{FF2B5EF4-FFF2-40B4-BE49-F238E27FC236}">
-                <a16:creationId xmlns:a16="http://schemas.microsoft.com/office/drawing/2014/main" id="{8F65C0EF-CF7B-49A4-8FFC-EB74881EB874}"/>
+                <a16:creationId xmlns:a16="http://schemas.microsoft.com/office/drawing/2014/main" id="{2E2E8756-8FBA-4A53-8F85-13231DA2C25E}"/>
               </a:ext>
             </a:extLst>
           </p:cNvPr>
@@ -6208,13 +6558,13 @@
             <a:spLocks noGrp="1"/>
           </p:cNvSpPr>
           <p:nvPr>
-            <p:ph type="title"/>
+            <p:ph type="ctrTitle"/>
           </p:nvPr>
         </p:nvSpPr>
         <p:spPr>
           <a:xfrm>
-            <a:off x="684212" y="4487332"/>
-            <a:ext cx="8534400" cy="1507067"/>
+            <a:off x="684212" y="685799"/>
+            <a:ext cx="8001000" cy="2971801"/>
           </a:xfrm>
         </p:spPr>
         <p:txBody>
@@ -6225,17 +6575,17 @@
           <a:p>
             <a:r>
               <a:rPr lang="en-US" dirty="0"/>
-              <a:t>Vehicle industry</a:t>
-            </a:r>
-          </a:p>
-        </p:txBody>
-      </p:sp>
-      <p:sp>
-        <p:nvSpPr>
-          <p:cNvPr id="3" name="Content Placeholder 2">
+              <a:t>Related work</a:t>
+            </a:r>
+          </a:p>
+        </p:txBody>
+      </p:sp>
+      <p:sp>
+        <p:nvSpPr>
+          <p:cNvPr id="3" name="Subtitle 2">
             <a:extLst>
               <a:ext uri="{FF2B5EF4-FFF2-40B4-BE49-F238E27FC236}">
-                <a16:creationId xmlns:a16="http://schemas.microsoft.com/office/drawing/2014/main" id="{657D7D6C-D141-4BFA-B892-3EAC21597085}"/>
+                <a16:creationId xmlns:a16="http://schemas.microsoft.com/office/drawing/2014/main" id="{D66E569F-6ABB-42AA-9EFE-D31270BED79A}"/>
               </a:ext>
             </a:extLst>
           </p:cNvPr>
@@ -6243,100 +6593,94 @@
             <a:spLocks noGrp="1"/>
           </p:cNvSpPr>
           <p:nvPr>
-            <p:ph idx="1"/>
+            <p:ph type="subTitle" idx="1"/>
           </p:nvPr>
         </p:nvSpPr>
         <p:spPr>
           <a:xfrm>
-            <a:off x="684212" y="685800"/>
-            <a:ext cx="8534400" cy="3615267"/>
+            <a:off x="684211" y="3843867"/>
+            <a:ext cx="9917528" cy="1947333"/>
           </a:xfrm>
         </p:spPr>
         <p:txBody>
           <a:bodyPr>
-            <a:normAutofit/>
+            <a:normAutofit fontScale="70000" lnSpcReduction="20000"/>
           </a:bodyPr>
           <a:lstStyle/>
           <a:p>
+            <a:pPr marL="342900" indent="-342900">
+              <a:buFont typeface="Arial" panose="020B0604020202020204" pitchFamily="34" charset="0"/>
+              <a:buChar char="•"/>
+            </a:pPr>
             <a:r>
               <a:rPr lang="en-US" dirty="0">
                 <a:solidFill>
                   <a:schemeClr val="tx1"/>
                 </a:solidFill>
               </a:rPr>
-              <a:t>How do they come up with their pricing?</a:t>
-            </a:r>
-          </a:p>
-          <a:p>
-            <a:pPr marL="457200" lvl="1" indent="0">
-              <a:buNone/>
+              <a:t>https://www.kaggle.com/abineshkumark/carsdata</a:t>
+            </a:r>
+          </a:p>
+          <a:p>
+            <a:pPr marL="342900" indent="-342900">
+              <a:buFont typeface="Arial" panose="020B0604020202020204" pitchFamily="34" charset="0"/>
+              <a:buChar char="•"/>
             </a:pPr>
-            <a:endParaRPr lang="en-US" dirty="0">
-              <a:solidFill>
-                <a:schemeClr val="tx1"/>
-              </a:solidFill>
-            </a:endParaRPr>
-          </a:p>
-        </p:txBody>
-      </p:sp>
-      <p:pic>
-        <p:nvPicPr>
-          <p:cNvPr id="6" name="Picture 5">
-            <a:extLst>
-              <a:ext uri="{FF2B5EF4-FFF2-40B4-BE49-F238E27FC236}">
-                <a16:creationId xmlns:a16="http://schemas.microsoft.com/office/drawing/2014/main" id="{6877EF31-A0C8-4C80-B6D9-571045E22073}"/>
-              </a:ext>
-            </a:extLst>
-          </p:cNvPr>
-          <p:cNvPicPr>
-            <a:picLocks noChangeAspect="1"/>
-          </p:cNvPicPr>
-          <p:nvPr/>
-        </p:nvPicPr>
-        <p:blipFill>
-          <a:blip r:embed="rId3">
-            <a:extLst>
-              <a:ext uri="{28A0092B-C50C-407E-A947-70E740481C1C}">
-                <a14:useLocalDpi xmlns:a14="http://schemas.microsoft.com/office/drawing/2010/main" val="0"/>
-              </a:ext>
-            </a:extLst>
-          </a:blip>
-          <a:stretch>
-            <a:fillRect/>
-          </a:stretch>
-        </p:blipFill>
-        <p:spPr>
-          <a:xfrm>
-            <a:off x="1863656" y="2914843"/>
-            <a:ext cx="9440449" cy="514157"/>
-          </a:xfrm>
-          <a:prstGeom prst="rect">
-            <a:avLst/>
-          </a:prstGeom>
-        </p:spPr>
-      </p:pic>
+            <a:r>
+              <a:rPr lang="en-US" dirty="0">
+                <a:solidFill>
+                  <a:schemeClr val="tx1"/>
+                </a:solidFill>
+              </a:rPr>
+              <a:t>https://github.com/dkeske/CarPrice</a:t>
+            </a:r>
+          </a:p>
+          <a:p>
+            <a:r>
+              <a:rPr lang="en-US" dirty="0">
+                <a:solidFill>
+                  <a:schemeClr val="tx1"/>
+                </a:solidFill>
+              </a:rPr>
+              <a:t>    -  Linear and ridge regression to predict price of a car based on car adds posted on a website</a:t>
+            </a:r>
+          </a:p>
+          <a:p>
+            <a:pPr marL="342900" indent="-342900">
+              <a:buFont typeface="Arial" panose="020B0604020202020204" pitchFamily="34" charset="0"/>
+              <a:buChar char="•"/>
+            </a:pPr>
+            <a:r>
+              <a:rPr lang="en-US" dirty="0">
+                <a:solidFill>
+                  <a:schemeClr val="tx1"/>
+                </a:solidFill>
+              </a:rPr>
+              <a:t>https://towardsdatascience.com/build-develop-and-deploy-a-machine-learning-model-to-predict-cars-price-using-gradient-boosting-2d4d78fddf09</a:t>
+            </a:r>
+          </a:p>
+          <a:p>
+            <a:r>
+              <a:rPr lang="en-US" dirty="0">
+                <a:solidFill>
+                  <a:schemeClr val="tx1"/>
+                </a:solidFill>
+              </a:rPr>
+              <a:t>    -   4 regression models based on features. Choosing the model with the best correlation and Root 	Mean  Squared Error</a:t>
+            </a:r>
+          </a:p>
+        </p:txBody>
+      </p:sp>
     </p:spTree>
     <p:extLst>
       <p:ext uri="{BB962C8B-B14F-4D97-AF65-F5344CB8AC3E}">
-        <p14:creationId xmlns:p14="http://schemas.microsoft.com/office/powerpoint/2010/main" val="160609058"/>
+        <p14:creationId xmlns:p14="http://schemas.microsoft.com/office/powerpoint/2010/main" val="3682283255"/>
       </p:ext>
     </p:extLst>
   </p:cSld>
   <p:clrMapOvr>
     <a:masterClrMapping/>
   </p:clrMapOvr>
-  <mc:AlternateContent xmlns:mc="http://schemas.openxmlformats.org/markup-compatibility/2006" xmlns:p159="http://schemas.microsoft.com/office/powerpoint/2015/09/main">
-    <mc:Choice Requires="p159">
-      <p:transition xmlns:p14="http://schemas.microsoft.com/office/powerpoint/2010/main" spd="slow" p14:dur="2000">
-        <p159:morph option="byObject"/>
-      </p:transition>
-    </mc:Choice>
-    <mc:Fallback xmlns="">
-      <p:transition spd="slow">
-        <p:fade/>
-      </p:transition>
-    </mc:Fallback>
-  </mc:AlternateContent>
 </p:sld>
 </file>
 
@@ -6453,7 +6797,7 @@
         </p:blipFill>
         <p:spPr>
           <a:xfrm>
-            <a:off x="3174" y="-182870"/>
+            <a:off x="3174" y="10"/>
             <a:ext cx="12192000" cy="6857990"/>
           </a:xfrm>
           <a:prstGeom prst="rect">
@@ -6524,72 +6868,28 @@
           </a:bodyPr>
           <a:lstStyle/>
           <a:p>
+            <a:r>
+              <a:rPr lang="en-US" dirty="0">
+                <a:solidFill>
+                  <a:schemeClr val="tx1"/>
+                </a:solidFill>
+              </a:rPr>
+              <a:t>How do they come up with their pricing?</a:t>
+            </a:r>
+          </a:p>
+          <a:p>
             <a:endParaRPr lang="en-US" dirty="0">
               <a:solidFill>
                 <a:schemeClr val="tx1"/>
               </a:solidFill>
             </a:endParaRPr>
           </a:p>
-          <a:p>
-            <a:r>
-              <a:rPr lang="en-US" dirty="0">
-                <a:solidFill>
-                  <a:schemeClr val="tx1"/>
-                </a:solidFill>
-              </a:rPr>
-              <a:t>How do they come up with their pricing?</a:t>
-            </a:r>
-          </a:p>
-          <a:p>
-            <a:pPr lvl="1">
-              <a:buFont typeface="Wingdings" panose="05000000000000000000" pitchFamily="2" charset="2"/>
-              <a:buChar char="v"/>
-            </a:pPr>
-            <a:r>
-              <a:rPr lang="en-US" dirty="0">
-                <a:solidFill>
-                  <a:schemeClr val="tx1"/>
-                </a:solidFill>
-              </a:rPr>
-              <a:t>Origin</a:t>
-            </a:r>
-          </a:p>
-          <a:p>
-            <a:pPr marL="457200" lvl="1" indent="0">
-              <a:buNone/>
-            </a:pPr>
-            <a:endParaRPr lang="en-US" dirty="0">
-              <a:solidFill>
-                <a:schemeClr val="tx1"/>
-              </a:solidFill>
-            </a:endParaRPr>
-          </a:p>
-          <a:p>
-            <a:pPr marL="914400" lvl="2" indent="0">
-              <a:buNone/>
-            </a:pPr>
-            <a:endParaRPr lang="en-US" dirty="0">
-              <a:solidFill>
-                <a:schemeClr val="tx1"/>
-              </a:solidFill>
-            </a:endParaRPr>
-          </a:p>
-          <a:p>
-            <a:pPr marL="0" indent="0">
-              <a:buNone/>
-            </a:pPr>
-            <a:endParaRPr lang="en-US" dirty="0">
-              <a:solidFill>
-                <a:schemeClr val="tx1"/>
-              </a:solidFill>
-            </a:endParaRPr>
-          </a:p>
         </p:txBody>
       </p:sp>
     </p:spTree>
     <p:extLst>
       <p:ext uri="{BB962C8B-B14F-4D97-AF65-F5344CB8AC3E}">
-        <p14:creationId xmlns:p14="http://schemas.microsoft.com/office/powerpoint/2010/main" val="467713356"/>
+        <p14:creationId xmlns:p14="http://schemas.microsoft.com/office/powerpoint/2010/main" val="2878631596"/>
       </p:ext>
     </p:extLst>
   </p:cSld>
@@ -6598,13 +6898,13 @@
   </p:clrMapOvr>
   <mc:AlternateContent xmlns:mc="http://schemas.openxmlformats.org/markup-compatibility/2006" xmlns:p14="http://schemas.microsoft.com/office/powerpoint/2010/main">
     <mc:Choice Requires="p14">
-      <p:transition spd="slow" p14:dur="800">
-        <p:circle/>
+      <p:transition spd="med" p14:dur="700">
+        <p:fade/>
       </p:transition>
     </mc:Choice>
     <mc:Fallback xmlns="">
-      <p:transition spd="slow">
-        <p:circle/>
+      <p:transition spd="med">
+        <p:fade/>
       </p:transition>
     </mc:Fallback>
   </mc:AlternateContent>
@@ -6724,7 +7024,7 @@
         </p:blipFill>
         <p:spPr>
           <a:xfrm>
-            <a:off x="3174" y="-182870"/>
+            <a:off x="3174" y="10"/>
             <a:ext cx="12192000" cy="6857990"/>
           </a:xfrm>
           <a:prstGeom prst="rect">
@@ -6805,60 +7105,14 @@
             </a:r>
           </a:p>
           <a:p>
-            <a:pPr lvl="1">
-              <a:buFont typeface="Wingdings" panose="05000000000000000000" pitchFamily="2" charset="2"/>
-              <a:buChar char="v"/>
+            <a:pPr marL="457200" lvl="1" indent="0">
+              <a:buNone/>
             </a:pPr>
-            <a:r>
-              <a:rPr lang="en-US" dirty="0">
-                <a:solidFill>
-                  <a:schemeClr val="tx1"/>
-                </a:solidFill>
-              </a:rPr>
-              <a:t>Origin:</a:t>
-            </a:r>
-          </a:p>
-          <a:p>
-            <a:pPr lvl="2">
-              <a:buFont typeface="Wingdings" panose="05000000000000000000" pitchFamily="2" charset="2"/>
-              <a:buChar char="§"/>
-            </a:pPr>
-            <a:r>
-              <a:rPr lang="en-US" dirty="0">
-                <a:solidFill>
-                  <a:schemeClr val="tx1"/>
-                </a:solidFill>
-              </a:rPr>
-              <a:t>Europe</a:t>
-            </a:r>
-          </a:p>
-          <a:p>
-            <a:pPr lvl="2">
-              <a:buFont typeface="Wingdings" panose="05000000000000000000" pitchFamily="2" charset="2"/>
-              <a:buChar char="§"/>
-            </a:pPr>
-            <a:r>
-              <a:rPr lang="en-US" dirty="0">
-                <a:solidFill>
-                  <a:schemeClr val="tx1"/>
-                </a:solidFill>
-              </a:rPr>
-              <a:t>Asia</a:t>
-            </a:r>
-          </a:p>
-          <a:p>
-            <a:pPr lvl="2">
-              <a:buFont typeface="Wingdings" panose="05000000000000000000" pitchFamily="2" charset="2"/>
-              <a:buChar char="§"/>
-            </a:pPr>
-            <a:r>
-              <a:rPr lang="en-US" dirty="0">
-                <a:solidFill>
-                  <a:schemeClr val="tx1"/>
-                </a:solidFill>
-              </a:rPr>
-              <a:t>USA</a:t>
-            </a:r>
+            <a:endParaRPr lang="en-US" dirty="0">
+              <a:solidFill>
+                <a:schemeClr val="tx1"/>
+              </a:solidFill>
+            </a:endParaRPr>
           </a:p>
         </p:txBody>
       </p:sp>
@@ -6867,7 +7121,7 @@
           <p:cNvPr id="6" name="Picture 5">
             <a:extLst>
               <a:ext uri="{FF2B5EF4-FFF2-40B4-BE49-F238E27FC236}">
-                <a16:creationId xmlns:a16="http://schemas.microsoft.com/office/drawing/2014/main" id="{01817458-B6B6-4E0A-BE98-12DBBD5899C6}"/>
+                <a16:creationId xmlns:a16="http://schemas.microsoft.com/office/drawing/2014/main" id="{6877EF31-A0C8-4C80-B6D9-571045E22073}"/>
               </a:ext>
             </a:extLst>
           </p:cNvPr>
@@ -6890,8 +7144,8 @@
         </p:blipFill>
         <p:spPr>
           <a:xfrm>
-            <a:off x="3302332" y="2082951"/>
-            <a:ext cx="5916280" cy="2692097"/>
+            <a:off x="1863656" y="2914843"/>
+            <a:ext cx="9440449" cy="514157"/>
           </a:xfrm>
           <a:prstGeom prst="rect">
             <a:avLst/>
@@ -6901,17 +7155,17 @@
     </p:spTree>
     <p:extLst>
       <p:ext uri="{BB962C8B-B14F-4D97-AF65-F5344CB8AC3E}">
-        <p14:creationId xmlns:p14="http://schemas.microsoft.com/office/powerpoint/2010/main" val="4235733151"/>
+        <p14:creationId xmlns:p14="http://schemas.microsoft.com/office/powerpoint/2010/main" val="160609058"/>
       </p:ext>
     </p:extLst>
   </p:cSld>
   <p:clrMapOvr>
     <a:masterClrMapping/>
   </p:clrMapOvr>
-  <mc:AlternateContent xmlns:mc="http://schemas.openxmlformats.org/markup-compatibility/2006" xmlns:p14="http://schemas.microsoft.com/office/powerpoint/2010/main">
-    <mc:Choice Requires="p14">
-      <p:transition spd="slow" p14:dur="3400">
-        <p14:reveal/>
+  <mc:AlternateContent xmlns:mc="http://schemas.openxmlformats.org/markup-compatibility/2006" xmlns:p159="http://schemas.microsoft.com/office/powerpoint/2015/09/main">
+    <mc:Choice Requires="p159">
+      <p:transition xmlns:p14="http://schemas.microsoft.com/office/powerpoint/2010/main" spd="slow" p14:dur="2000">
+        <p159:morph option="byObject"/>
       </p:transition>
     </mc:Choice>
     <mc:Fallback xmlns="">
@@ -7138,21 +7392,7 @@
             </a:r>
           </a:p>
           <a:p>
-            <a:pPr lvl="1">
-              <a:buFont typeface="Wingdings" panose="05000000000000000000" pitchFamily="2" charset="2"/>
-              <a:buChar char="v"/>
-            </a:pPr>
-            <a:r>
-              <a:rPr lang="en-US" dirty="0">
-                <a:solidFill>
-                  <a:schemeClr val="tx1"/>
-                </a:solidFill>
-              </a:rPr>
-              <a:t>Make</a:t>
-            </a:r>
-          </a:p>
-          <a:p>
-            <a:pPr marL="914400" lvl="2" indent="0">
+            <a:pPr marL="457200" lvl="1" indent="0">
               <a:buNone/>
             </a:pPr>
             <a:endParaRPr lang="en-US" dirty="0">
@@ -7162,7 +7402,7 @@
             </a:endParaRPr>
           </a:p>
           <a:p>
-            <a:pPr marL="0" indent="0">
+            <a:pPr marL="914400" lvl="2" indent="0">
               <a:buNone/>
             </a:pPr>
             <a:endParaRPr lang="en-US" dirty="0">
@@ -7171,27 +7411,37 @@
               </a:solidFill>
             </a:endParaRPr>
           </a:p>
+          <a:p>
+            <a:pPr marL="0" indent="0">
+              <a:buNone/>
+            </a:pPr>
+            <a:endParaRPr lang="en-US" dirty="0">
+              <a:solidFill>
+                <a:schemeClr val="tx1"/>
+              </a:solidFill>
+            </a:endParaRPr>
+          </a:p>
         </p:txBody>
       </p:sp>
     </p:spTree>
     <p:extLst>
       <p:ext uri="{BB962C8B-B14F-4D97-AF65-F5344CB8AC3E}">
-        <p14:creationId xmlns:p14="http://schemas.microsoft.com/office/powerpoint/2010/main" val="2780599325"/>
+        <p14:creationId xmlns:p14="http://schemas.microsoft.com/office/powerpoint/2010/main" val="467713356"/>
       </p:ext>
     </p:extLst>
   </p:cSld>
   <p:clrMapOvr>
     <a:masterClrMapping/>
   </p:clrMapOvr>
-  <mc:AlternateContent xmlns:mc="http://schemas.openxmlformats.org/markup-compatibility/2006">
-    <mc:Choice xmlns:p159="http://schemas.microsoft.com/office/powerpoint/2015/09/main" Requires="p159">
-      <p:transition xmlns:p14="http://schemas.microsoft.com/office/powerpoint/2010/main" spd="slow" p14:dur="2000">
-        <p159:morph option="byObject"/>
+  <mc:AlternateContent xmlns:mc="http://schemas.openxmlformats.org/markup-compatibility/2006" xmlns:p14="http://schemas.microsoft.com/office/powerpoint/2010/main">
+    <mc:Choice Requires="p14">
+      <p:transition spd="slow" p14:dur="800">
+        <p:circle/>
       </p:transition>
     </mc:Choice>
-    <mc:Fallback>
+    <mc:Fallback xmlns="">
       <p:transition spd="slow">
-        <p:fade/>
+        <p:circle/>
       </p:transition>
     </mc:Fallback>
   </mc:AlternateContent>
@@ -7311,7 +7561,7 @@
         </p:blipFill>
         <p:spPr>
           <a:xfrm>
-            <a:off x="3175" y="387506"/>
+            <a:off x="3174" y="-182870"/>
             <a:ext cx="12192000" cy="6857990"/>
           </a:xfrm>
           <a:prstGeom prst="rect">
@@ -7382,13 +7632,6 @@
           </a:bodyPr>
           <a:lstStyle/>
           <a:p>
-            <a:endParaRPr lang="en-US" dirty="0">
-              <a:solidFill>
-                <a:schemeClr val="tx1"/>
-              </a:solidFill>
-            </a:endParaRPr>
-          </a:p>
-          <a:p>
             <a:r>
               <a:rPr lang="en-US" dirty="0">
                 <a:solidFill>
@@ -7409,22 +7652,27 @@
                   <a:schemeClr val="tx1"/>
                 </a:solidFill>
               </a:rPr>
-              <a:t>Make</a:t>
-            </a:r>
-          </a:p>
-          <a:p>
-            <a:pPr marL="914400" lvl="2" indent="0">
-              <a:buNone/>
+              <a:t>Origin:</a:t>
+            </a:r>
+          </a:p>
+          <a:p>
+            <a:pPr lvl="2">
+              <a:buFont typeface="Wingdings" panose="05000000000000000000" pitchFamily="2" charset="2"/>
+              <a:buChar char="§"/>
             </a:pPr>
-            <a:endParaRPr lang="en-US" dirty="0">
-              <a:solidFill>
-                <a:schemeClr val="tx1"/>
-              </a:solidFill>
-            </a:endParaRPr>
-          </a:p>
-          <a:p>
-            <a:pPr marL="0" indent="0">
-              <a:buNone/>
+            <a:r>
+              <a:rPr lang="en-US" dirty="0">
+                <a:solidFill>
+                  <a:schemeClr val="tx1"/>
+                </a:solidFill>
+              </a:rPr>
+              <a:t>Europe</a:t>
+            </a:r>
+          </a:p>
+          <a:p>
+            <a:pPr lvl="2">
+              <a:buFont typeface="Wingdings" panose="05000000000000000000" pitchFamily="2" charset="2"/>
+              <a:buChar char="§"/>
             </a:pPr>
             <a:r>
               <a:rPr lang="en-US" dirty="0">
@@ -7432,17 +7680,31 @@
                   <a:schemeClr val="tx1"/>
                 </a:solidFill>
               </a:rPr>
-              <a:t>		</a:t>
+              <a:t>Asia</a:t>
+            </a:r>
+          </a:p>
+          <a:p>
+            <a:pPr lvl="2">
+              <a:buFont typeface="Wingdings" panose="05000000000000000000" pitchFamily="2" charset="2"/>
+              <a:buChar char="§"/>
+            </a:pPr>
+            <a:r>
+              <a:rPr lang="en-US" dirty="0">
+                <a:solidFill>
+                  <a:schemeClr val="tx1"/>
+                </a:solidFill>
+              </a:rPr>
+              <a:t>USA</a:t>
             </a:r>
           </a:p>
         </p:txBody>
       </p:sp>
       <p:pic>
         <p:nvPicPr>
-          <p:cNvPr id="8" name="Picture 7">
+          <p:cNvPr id="6" name="Picture 5">
             <a:extLst>
               <a:ext uri="{FF2B5EF4-FFF2-40B4-BE49-F238E27FC236}">
-                <a16:creationId xmlns:a16="http://schemas.microsoft.com/office/drawing/2014/main" id="{C7268D95-5B42-438D-9EB7-29FAE6EB642C}"/>
+                <a16:creationId xmlns:a16="http://schemas.microsoft.com/office/drawing/2014/main" id="{01817458-B6B6-4E0A-BE98-12DBBD5899C6}"/>
               </a:ext>
             </a:extLst>
           </p:cNvPr>
@@ -7465,8 +7727,8 @@
         </p:blipFill>
         <p:spPr>
           <a:xfrm>
-            <a:off x="3156733" y="2336645"/>
-            <a:ext cx="6296756" cy="2650222"/>
+            <a:off x="3302332" y="2082951"/>
+            <a:ext cx="5916280" cy="2692097"/>
           </a:xfrm>
           <a:prstGeom prst="rect">
             <a:avLst/>
@@ -7476,20 +7738,20 @@
     </p:spTree>
     <p:extLst>
       <p:ext uri="{BB962C8B-B14F-4D97-AF65-F5344CB8AC3E}">
-        <p14:creationId xmlns:p14="http://schemas.microsoft.com/office/powerpoint/2010/main" val="3994080204"/>
+        <p14:creationId xmlns:p14="http://schemas.microsoft.com/office/powerpoint/2010/main" val="4235733151"/>
       </p:ext>
     </p:extLst>
   </p:cSld>
   <p:clrMapOvr>
     <a:masterClrMapping/>
   </p:clrMapOvr>
-  <mc:AlternateContent xmlns:mc="http://schemas.openxmlformats.org/markup-compatibility/2006">
-    <mc:Choice xmlns:p14="http://schemas.microsoft.com/office/powerpoint/2010/main" Requires="p14">
+  <mc:AlternateContent xmlns:mc="http://schemas.openxmlformats.org/markup-compatibility/2006" xmlns:p14="http://schemas.microsoft.com/office/powerpoint/2010/main">
+    <mc:Choice Requires="p14">
       <p:transition spd="slow" p14:dur="3400">
         <p14:reveal/>
       </p:transition>
     </mc:Choice>
-    <mc:Fallback>
+    <mc:Fallback xmlns="">
       <p:transition spd="slow">
         <p:fade/>
       </p:transition>
@@ -7611,7 +7873,7 @@
         </p:blipFill>
         <p:spPr>
           <a:xfrm>
-            <a:off x="-3175" y="182890"/>
+            <a:off x="3174" y="-182870"/>
             <a:ext cx="12192000" cy="6857990"/>
           </a:xfrm>
           <a:prstGeom prst="rect">
@@ -7619,23 +7881,152 @@
           </a:prstGeom>
         </p:spPr>
       </p:pic>
+      <p:sp>
+        <p:nvSpPr>
+          <p:cNvPr id="2" name="Title 1">
+            <a:extLst>
+              <a:ext uri="{FF2B5EF4-FFF2-40B4-BE49-F238E27FC236}">
+                <a16:creationId xmlns:a16="http://schemas.microsoft.com/office/drawing/2014/main" id="{8F65C0EF-CF7B-49A4-8FFC-EB74881EB874}"/>
+              </a:ext>
+            </a:extLst>
+          </p:cNvPr>
+          <p:cNvSpPr>
+            <a:spLocks noGrp="1"/>
+          </p:cNvSpPr>
+          <p:nvPr>
+            <p:ph type="title"/>
+          </p:nvPr>
+        </p:nvSpPr>
+        <p:spPr>
+          <a:xfrm>
+            <a:off x="684212" y="4487332"/>
+            <a:ext cx="8534400" cy="1507067"/>
+          </a:xfrm>
+        </p:spPr>
+        <p:txBody>
+          <a:bodyPr>
+            <a:normAutofit/>
+          </a:bodyPr>
+          <a:lstStyle/>
+          <a:p>
+            <a:r>
+              <a:rPr lang="en-US" dirty="0"/>
+              <a:t>Vehicle industry</a:t>
+            </a:r>
+          </a:p>
+        </p:txBody>
+      </p:sp>
+      <p:sp>
+        <p:nvSpPr>
+          <p:cNvPr id="3" name="Content Placeholder 2">
+            <a:extLst>
+              <a:ext uri="{FF2B5EF4-FFF2-40B4-BE49-F238E27FC236}">
+                <a16:creationId xmlns:a16="http://schemas.microsoft.com/office/drawing/2014/main" id="{657D7D6C-D141-4BFA-B892-3EAC21597085}"/>
+              </a:ext>
+            </a:extLst>
+          </p:cNvPr>
+          <p:cNvSpPr>
+            <a:spLocks noGrp="1"/>
+          </p:cNvSpPr>
+          <p:nvPr>
+            <p:ph idx="1"/>
+          </p:nvPr>
+        </p:nvSpPr>
+        <p:spPr>
+          <a:xfrm>
+            <a:off x="684212" y="685800"/>
+            <a:ext cx="8534400" cy="3615267"/>
+          </a:xfrm>
+        </p:spPr>
+        <p:txBody>
+          <a:bodyPr>
+            <a:normAutofit/>
+          </a:bodyPr>
+          <a:lstStyle/>
+          <a:p>
+            <a:endParaRPr lang="en-US" dirty="0">
+              <a:solidFill>
+                <a:schemeClr val="tx1"/>
+              </a:solidFill>
+            </a:endParaRPr>
+          </a:p>
+          <a:p>
+            <a:r>
+              <a:rPr lang="en-US" dirty="0">
+                <a:solidFill>
+                  <a:schemeClr val="tx1"/>
+                </a:solidFill>
+              </a:rPr>
+              <a:t>How do they come up with their pricing?</a:t>
+            </a:r>
+          </a:p>
+          <a:p>
+            <a:pPr lvl="1">
+              <a:buFont typeface="Wingdings" panose="05000000000000000000" pitchFamily="2" charset="2"/>
+              <a:buChar char="v"/>
+            </a:pPr>
+            <a:r>
+              <a:rPr lang="en-US" dirty="0">
+                <a:solidFill>
+                  <a:schemeClr val="tx1"/>
+                </a:solidFill>
+              </a:rPr>
+              <a:t>Origin</a:t>
+            </a:r>
+          </a:p>
+          <a:p>
+            <a:pPr lvl="1">
+              <a:buFont typeface="Wingdings" panose="05000000000000000000" pitchFamily="2" charset="2"/>
+              <a:buChar char="v"/>
+            </a:pPr>
+            <a:r>
+              <a:rPr lang="en-US" dirty="0">
+                <a:solidFill>
+                  <a:schemeClr val="tx1"/>
+                </a:solidFill>
+              </a:rPr>
+              <a:t>Make</a:t>
+            </a:r>
+          </a:p>
+          <a:p>
+            <a:pPr marL="914400" lvl="2" indent="0">
+              <a:buNone/>
+            </a:pPr>
+            <a:endParaRPr lang="en-US" dirty="0">
+              <a:solidFill>
+                <a:schemeClr val="tx1"/>
+              </a:solidFill>
+            </a:endParaRPr>
+          </a:p>
+          <a:p>
+            <a:pPr marL="0" indent="0">
+              <a:buNone/>
+            </a:pPr>
+            <a:endParaRPr lang="en-US" dirty="0">
+              <a:solidFill>
+                <a:schemeClr val="tx1"/>
+              </a:solidFill>
+            </a:endParaRPr>
+          </a:p>
+        </p:txBody>
+      </p:sp>
     </p:spTree>
     <p:extLst>
       <p:ext uri="{BB962C8B-B14F-4D97-AF65-F5344CB8AC3E}">
-        <p14:creationId xmlns:p14="http://schemas.microsoft.com/office/powerpoint/2010/main" val="2369271949"/>
+        <p14:creationId xmlns:p14="http://schemas.microsoft.com/office/powerpoint/2010/main" val="2780599325"/>
       </p:ext>
     </p:extLst>
   </p:cSld>
   <p:clrMapOvr>
     <a:masterClrMapping/>
   </p:clrMapOvr>
-  <mc:AlternateContent xmlns:mc="http://schemas.openxmlformats.org/markup-compatibility/2006">
-    <mc:Choice xmlns:p14="http://schemas.microsoft.com/office/powerpoint/2010/main" Requires="p14">
-      <p:transition spd="slow" p14:dur="3400">
-        <p14:reveal/>
+  <mc:AlternateContent xmlns:mc="http://schemas.openxmlformats.org/markup-compatibility/2006" xmlns:p159="http://schemas.microsoft.com/office/powerpoint/2015/09/main">
+    <mc:Choice Requires="p159">
+      <p:transition xmlns:p14="http://schemas.microsoft.com/office/powerpoint/2010/main" spd="slow" p14:dur="2000">
+        <p159:morph option="byObject"/>
       </p:transition>
     </mc:Choice>
-    <mc:Fallback>
+    <mc:Fallback xmlns="">
       <p:transition spd="slow">
         <p:fade/>
       </p:transition>
@@ -7757,7 +8148,7 @@
         </p:blipFill>
         <p:spPr>
           <a:xfrm>
-            <a:off x="-3175" y="182890"/>
+            <a:off x="3175" y="387506"/>
             <a:ext cx="12192000" cy="6857990"/>
           </a:xfrm>
           <a:prstGeom prst="rect">
@@ -7767,57 +8158,176 @@
       </p:pic>
       <p:sp>
         <p:nvSpPr>
-          <p:cNvPr id="3" name="TextBox 2">
+          <p:cNvPr id="2" name="Title 1">
             <a:extLst>
               <a:ext uri="{FF2B5EF4-FFF2-40B4-BE49-F238E27FC236}">
-                <a16:creationId xmlns:a16="http://schemas.microsoft.com/office/drawing/2014/main" id="{85D53657-5A01-48AA-8B74-7CD9526778E0}"/>
+                <a16:creationId xmlns:a16="http://schemas.microsoft.com/office/drawing/2014/main" id="{8F65C0EF-CF7B-49A4-8FFC-EB74881EB874}"/>
               </a:ext>
             </a:extLst>
           </p:cNvPr>
-          <p:cNvSpPr txBox="1"/>
+          <p:cNvSpPr>
+            <a:spLocks noGrp="1"/>
+          </p:cNvSpPr>
+          <p:nvPr>
+            <p:ph type="title"/>
+          </p:nvPr>
+        </p:nvSpPr>
+        <p:spPr>
+          <a:xfrm>
+            <a:off x="684212" y="4487332"/>
+            <a:ext cx="8534400" cy="1507067"/>
+          </a:xfrm>
+        </p:spPr>
+        <p:txBody>
+          <a:bodyPr>
+            <a:normAutofit/>
+          </a:bodyPr>
+          <a:lstStyle/>
+          <a:p>
+            <a:r>
+              <a:rPr lang="en-US" dirty="0"/>
+              <a:t>Vehicle industry</a:t>
+            </a:r>
+          </a:p>
+        </p:txBody>
+      </p:sp>
+      <p:sp>
+        <p:nvSpPr>
+          <p:cNvPr id="3" name="Content Placeholder 2">
+            <a:extLst>
+              <a:ext uri="{FF2B5EF4-FFF2-40B4-BE49-F238E27FC236}">
+                <a16:creationId xmlns:a16="http://schemas.microsoft.com/office/drawing/2014/main" id="{657D7D6C-D141-4BFA-B892-3EAC21597085}"/>
+              </a:ext>
+            </a:extLst>
+          </p:cNvPr>
+          <p:cNvSpPr>
+            <a:spLocks noGrp="1"/>
+          </p:cNvSpPr>
+          <p:nvPr>
+            <p:ph idx="1"/>
+          </p:nvPr>
+        </p:nvSpPr>
+        <p:spPr>
+          <a:xfrm>
+            <a:off x="684212" y="685800"/>
+            <a:ext cx="8534400" cy="3615267"/>
+          </a:xfrm>
+        </p:spPr>
+        <p:txBody>
+          <a:bodyPr>
+            <a:normAutofit/>
+          </a:bodyPr>
+          <a:lstStyle/>
+          <a:p>
+            <a:endParaRPr lang="en-US" dirty="0">
+              <a:solidFill>
+                <a:schemeClr val="tx1"/>
+              </a:solidFill>
+            </a:endParaRPr>
+          </a:p>
+          <a:p>
+            <a:r>
+              <a:rPr lang="en-US" dirty="0">
+                <a:solidFill>
+                  <a:schemeClr val="tx1"/>
+                </a:solidFill>
+              </a:rPr>
+              <a:t>How do they come up with their pricing?</a:t>
+            </a:r>
+          </a:p>
+          <a:p>
+            <a:pPr lvl="1">
+              <a:buFont typeface="Wingdings" panose="05000000000000000000" pitchFamily="2" charset="2"/>
+              <a:buChar char="v"/>
+            </a:pPr>
+            <a:r>
+              <a:rPr lang="en-US" dirty="0">
+                <a:solidFill>
+                  <a:schemeClr val="tx1"/>
+                </a:solidFill>
+              </a:rPr>
+              <a:t>Make</a:t>
+            </a:r>
+          </a:p>
+          <a:p>
+            <a:pPr marL="914400" lvl="2" indent="0">
+              <a:buNone/>
+            </a:pPr>
+            <a:endParaRPr lang="en-US" dirty="0">
+              <a:solidFill>
+                <a:schemeClr val="tx1"/>
+              </a:solidFill>
+            </a:endParaRPr>
+          </a:p>
+          <a:p>
+            <a:pPr marL="0" indent="0">
+              <a:buNone/>
+            </a:pPr>
+            <a:r>
+              <a:rPr lang="en-US" dirty="0">
+                <a:solidFill>
+                  <a:schemeClr val="tx1"/>
+                </a:solidFill>
+              </a:rPr>
+              <a:t>		</a:t>
+            </a:r>
+          </a:p>
+        </p:txBody>
+      </p:sp>
+      <p:pic>
+        <p:nvPicPr>
+          <p:cNvPr id="8" name="Picture 7">
+            <a:extLst>
+              <a:ext uri="{FF2B5EF4-FFF2-40B4-BE49-F238E27FC236}">
+                <a16:creationId xmlns:a16="http://schemas.microsoft.com/office/drawing/2014/main" id="{C7268D95-5B42-438D-9EB7-29FAE6EB642C}"/>
+              </a:ext>
+            </a:extLst>
+          </p:cNvPr>
+          <p:cNvPicPr>
+            <a:picLocks noChangeAspect="1"/>
+          </p:cNvPicPr>
           <p:nvPr/>
-        </p:nvSpPr>
-        <p:spPr>
-          <a:xfrm rot="536217">
-            <a:off x="1603717" y="3242553"/>
-            <a:ext cx="5317588" cy="369332"/>
+        </p:nvPicPr>
+        <p:blipFill>
+          <a:blip r:embed="rId3">
+            <a:extLst>
+              <a:ext uri="{28A0092B-C50C-407E-A947-70E740481C1C}">
+                <a14:useLocalDpi xmlns:a14="http://schemas.microsoft.com/office/drawing/2010/main" val="0"/>
+              </a:ext>
+            </a:extLst>
+          </a:blip>
+          <a:stretch>
+            <a:fillRect/>
+          </a:stretch>
+        </p:blipFill>
+        <p:spPr>
+          <a:xfrm>
+            <a:off x="3156733" y="2336645"/>
+            <a:ext cx="6296756" cy="2650222"/>
           </a:xfrm>
           <a:prstGeom prst="rect">
             <a:avLst/>
           </a:prstGeom>
-          <a:noFill/>
-        </p:spPr>
-        <p:txBody>
-          <a:bodyPr wrap="square" rtlCol="0">
-            <a:spAutoFit/>
-          </a:bodyPr>
-          <a:lstStyle/>
-          <a:p>
-            <a:r>
-              <a:rPr lang="en-US" dirty="0"/>
-              <a:t>Questions?</a:t>
-            </a:r>
-          </a:p>
-        </p:txBody>
-      </p:sp>
+        </p:spPr>
+      </p:pic>
     </p:spTree>
     <p:extLst>
       <p:ext uri="{BB962C8B-B14F-4D97-AF65-F5344CB8AC3E}">
-        <p14:creationId xmlns:p14="http://schemas.microsoft.com/office/powerpoint/2010/main" val="2780474705"/>
+        <p14:creationId xmlns:p14="http://schemas.microsoft.com/office/powerpoint/2010/main" val="3994080204"/>
       </p:ext>
     </p:extLst>
   </p:cSld>
   <p:clrMapOvr>
     <a:masterClrMapping/>
   </p:clrMapOvr>
-  <mc:AlternateContent xmlns:mc="http://schemas.openxmlformats.org/markup-compatibility/2006">
-    <mc:Choice xmlns:p14="http://schemas.microsoft.com/office/powerpoint/2010/main" Requires="p14">
-      <p:transition spd="med" p14:dur="700">
-        <p:fade/>
+  <mc:AlternateContent xmlns:mc="http://schemas.openxmlformats.org/markup-compatibility/2006" xmlns:p14="http://schemas.microsoft.com/office/powerpoint/2010/main">
+    <mc:Choice Requires="p14">
+      <p:transition spd="slow" p14:dur="3400">
+        <p14:reveal/>
       </p:transition>
     </mc:Choice>
-    <mc:Fallback>
-      <p:transition spd="med">
+    <mc:Fallback xmlns="">
+      <p:transition spd="slow">
         <p:fade/>
       </p:transition>
     </mc:Fallback>

</xml_diff>